<commit_message>
lots of content updates
</commit_message>
<xml_diff>
--- a/quantitative-data-analysis/quantitative-data-analysis.pptx
+++ b/quantitative-data-analysis/quantitative-data-analysis.pptx
@@ -10,6 +10,14 @@
     <p:sldId id="258" r:id="rId4"/>
     <p:sldId id="259" r:id="rId5"/>
     <p:sldId id="260" r:id="rId6"/>
+    <p:sldId id="261" r:id="rId7"/>
+    <p:sldId id="262" r:id="rId8"/>
+    <p:sldId id="263" r:id="rId9"/>
+    <p:sldId id="264" r:id="rId10"/>
+    <p:sldId id="265" r:id="rId11"/>
+    <p:sldId id="266" r:id="rId12"/>
+    <p:sldId id="267" r:id="rId13"/>
+    <p:sldId id="268" r:id="rId14"/>
   </p:sldIdLst>
   <p:sldSz cx="9144000" cy="6858000" type="screen4x3"/>
   <p:notesSz cx="6858000" cy="9144000"/>
@@ -3186,6 +3194,18 @@
             </a:pPr>
             <a:br/>
             <a:br/>
+            <a:r>
+              <a:rPr/>
+              <a:t>Andy</a:t>
+            </a:r>
+            <a:r>
+              <a:rPr/>
+              <a:t> </a:t>
+            </a:r>
+            <a:r>
+              <a:rPr/>
+              <a:t>Grogan-Kaylor</a:t>
+            </a:r>
           </a:p>
         </p:txBody>
       </p:sp>
@@ -3209,7 +3229,2415 @@
             </a:pPr>
             <a:r>
               <a:rPr/>
-              <a:t>2021-09-07</a:t>
+              <a:t>2021-09-08</a:t>
+            </a:r>
+          </a:p>
+        </p:txBody>
+      </p:sp>
+    </p:spTree>
+  </p:cSld>
+</p:sld>
+</file>
+
+<file path=ppt/slides/slide10.xml><?xml version="1.0" encoding="utf-8"?>
+<p:sld xmlns:a="http://schemas.openxmlformats.org/drawingml/2006/main" xmlns:r="http://schemas.openxmlformats.org/officeDocument/2006/relationships" xmlns:p="http://schemas.openxmlformats.org/presentationml/2006/main">
+  <p:cSld>
+    <p:spTree>
+      <p:nvGrpSpPr>
+        <p:cNvPr id="1" name=""/>
+        <p:cNvGrpSpPr/>
+        <p:nvPr/>
+      </p:nvGrpSpPr>
+      <p:grpSpPr>
+        <a:xfrm>
+          <a:off x="0" y="0"/>
+          <a:ext cx="0" cy="0"/>
+          <a:chOff x="0" y="0"/>
+          <a:chExt cx="0" cy="0"/>
+        </a:xfrm>
+      </p:grpSpPr>
+      <p:sp>
+        <p:nvSpPr>
+          <p:cNvPr id="3" name="Content Placeholder 2"/>
+          <p:cNvSpPr>
+            <a:spLocks noGrp="1"/>
+          </p:cNvSpPr>
+          <p:nvPr>
+            <p:ph idx="1"/>
+          </p:nvPr>
+        </p:nvSpPr>
+        <p:spPr/>
+        <p:txBody>
+          <a:bodyPr/>
+          <a:lstStyle/>
+          <a:p>
+            <a:pPr lvl="0" marL="0" indent="0">
+              <a:buNone/>
+            </a:pPr>
+            <a:r>
+              <a:rPr/>
+              <a:t>Notice that…</a:t>
+            </a:r>
+          </a:p>
+          <a:p>
+            <a:pPr lvl="1"/>
+            <a:r>
+              <a:rPr/>
+              <a:t>There are variables in which we may not have interest (e.g. </a:t>
+            </a:r>
+            <a:r>
+              <a:rPr>
+                <a:latin typeface="Courier"/>
+              </a:rPr>
+              <a:t>somethingelse</a:t>
+            </a:r>
+            <a:r>
+              <a:rPr/>
+              <a:t>).</a:t>
+            </a:r>
+          </a:p>
+          <a:p>
+            <a:pPr lvl="1"/>
+            <a:r>
+              <a:rPr/>
+              <a:t>None of the variables have informative </a:t>
+            </a:r>
+            <a:r>
+              <a:rPr i="1"/>
+              <a:t>variable labels</a:t>
+            </a:r>
+            <a:r>
+              <a:rPr/>
+              <a:t>. We have to guess at what the variables mean.</a:t>
+            </a:r>
+          </a:p>
+          <a:p>
+            <a:pPr lvl="1"/>
+            <a:r>
+              <a:rPr/>
+              <a:t>Variables do not seem to have informative </a:t>
+            </a:r>
+            <a:r>
+              <a:rPr i="1"/>
+              <a:t>value labels</a:t>
+            </a:r>
+            <a:r>
+              <a:rPr/>
+              <a:t>. While somewhat intuitive, we have to guess at what the values mean.</a:t>
+            </a:r>
+          </a:p>
+          <a:p>
+            <a:pPr lvl="1"/>
+            <a:r>
+              <a:rPr/>
+              <a:t>Someone appears to 200 years old.</a:t>
+            </a:r>
+          </a:p>
+          <a:p>
+            <a:pPr lvl="1"/>
+            <a:r>
+              <a:rPr/>
+              <a:t>There appear to be missing values in the variable happy that need to be recoded.</a:t>
+            </a:r>
+          </a:p>
+        </p:txBody>
+      </p:sp>
+    </p:spTree>
+  </p:cSld>
+</p:sld>
+</file>
+
+<file path=ppt/slides/slide11.xml><?xml version="1.0" encoding="utf-8"?>
+<p:sld xmlns:a="http://schemas.openxmlformats.org/drawingml/2006/main" xmlns:r="http://schemas.openxmlformats.org/officeDocument/2006/relationships" xmlns:p="http://schemas.openxmlformats.org/presentationml/2006/main">
+  <p:cSld>
+    <p:spTree>
+      <p:nvGrpSpPr>
+        <p:cNvPr id="1" name=""/>
+        <p:cNvGrpSpPr/>
+        <p:nvPr/>
+      </p:nvGrpSpPr>
+      <p:grpSpPr>
+        <a:xfrm>
+          <a:off x="0" y="0"/>
+          <a:ext cx="0" cy="0"/>
+          <a:chOff x="0" y="0"/>
+          <a:chExt cx="0" cy="0"/>
+        </a:xfrm>
+      </p:grpSpPr>
+      <p:sp>
+        <p:nvSpPr>
+          <p:cNvPr id="2" name="Title 1"/>
+          <p:cNvSpPr>
+            <a:spLocks noGrp="1"/>
+          </p:cNvSpPr>
+          <p:nvPr>
+            <p:ph type="title"/>
+          </p:nvPr>
+        </p:nvSpPr>
+        <p:spPr>
+          <a:xfrm>
+            <a:off x="722313" y="4406900"/>
+            <a:ext cx="7772400" cy="1362075"/>
+          </a:xfrm>
+        </p:spPr>
+        <p:txBody>
+          <a:bodyPr/>
+          <a:lstStyle/>
+          <a:p>
+            <a:pPr lvl="0" marL="0" indent="0">
+              <a:buNone/>
+            </a:pPr>
+            <a:r>
+              <a:rPr/>
+              <a:t>Cleaning</a:t>
+            </a:r>
+            <a:r>
+              <a:rPr/>
+              <a:t> </a:t>
+            </a:r>
+            <a:r>
+              <a:rPr/>
+              <a:t>Data</a:t>
+            </a:r>
+          </a:p>
+        </p:txBody>
+      </p:sp>
+    </p:spTree>
+  </p:cSld>
+</p:sld>
+</file>
+
+<file path=ppt/slides/slide12.xml><?xml version="1.0" encoding="utf-8"?>
+<p:sld xmlns:a="http://schemas.openxmlformats.org/drawingml/2006/main" xmlns:r="http://schemas.openxmlformats.org/officeDocument/2006/relationships" xmlns:p="http://schemas.openxmlformats.org/presentationml/2006/main">
+  <p:cSld>
+    <p:spTree>
+      <p:nvGrpSpPr>
+        <p:cNvPr id="1" name=""/>
+        <p:cNvGrpSpPr/>
+        <p:nvPr/>
+      </p:nvGrpSpPr>
+      <p:grpSpPr>
+        <a:xfrm>
+          <a:off x="0" y="0"/>
+          <a:ext cx="0" cy="0"/>
+          <a:chOff x="0" y="0"/>
+          <a:chExt cx="0" cy="0"/>
+        </a:xfrm>
+      </p:grpSpPr>
+      <p:sp>
+        <p:nvSpPr>
+          <p:cNvPr id="3" name="Content Placeholder 2"/>
+          <p:cNvSpPr>
+            <a:spLocks noGrp="1"/>
+          </p:cNvSpPr>
+          <p:nvPr>
+            <p:ph idx="1"/>
+          </p:nvPr>
+        </p:nvSpPr>
+        <p:spPr/>
+        <p:txBody>
+          <a:bodyPr/>
+          <a:lstStyle/>
+          <a:p>
+            <a:pPr lvl="1">
+              <a:buAutoNum type="arabicPeriod"/>
+            </a:pPr>
+            <a:r>
+              <a:rPr/>
+              <a:t>Only keep the variables of interest.</a:t>
+            </a:r>
+          </a:p>
+          <a:p>
+            <a:pPr lvl="1">
+              <a:buAutoNum type="arabicPeriod"/>
+            </a:pPr>
+            <a:r>
+              <a:rPr/>
+              <a:t>Add variable labels (if we can).</a:t>
+            </a:r>
+          </a:p>
+          <a:p>
+            <a:pPr lvl="1">
+              <a:buAutoNum type="arabicPeriod"/>
+            </a:pPr>
+            <a:r>
+              <a:rPr/>
+              <a:t>Add value labels (if we can).</a:t>
+            </a:r>
+          </a:p>
+          <a:p>
+            <a:pPr lvl="1">
+              <a:buAutoNum type="arabicPeriod"/>
+            </a:pPr>
+            <a:r>
+              <a:rPr/>
+              <a:t>Recode outliers, values that are errors, or values that should be coded as missing</a:t>
+            </a:r>
+          </a:p>
+          <a:p>
+            <a:pPr lvl="0" marL="0" indent="0">
+              <a:spcBef>
+                <a:spcPts val="3000"/>
+              </a:spcBef>
+              <a:buNone/>
+            </a:pPr>
+            <a:r>
+              <a:rPr b="1"/>
+              <a:t>Excel and Google Sheets</a:t>
+            </a:r>
+          </a:p>
+          <a:p>
+            <a:pPr lvl="0" marL="0" indent="0">
+              <a:spcBef>
+                <a:spcPts val="3000"/>
+              </a:spcBef>
+              <a:buNone/>
+            </a:pPr>
+            <a:r>
+              <a:rPr b="1"/>
+              <a:t>1. Only keep the variables of interest.</a:t>
+            </a:r>
+          </a:p>
+          <a:p>
+            <a:pPr lvl="0" marL="1270000" indent="0">
+              <a:buNone/>
+            </a:pPr>
+            <a:r>
+              <a:rPr sz="2000"/>
+              <a:t>Select the column, or columns, of data that you wish to remove, and right click, or control click, to delete them.</a:t>
+            </a:r>
+          </a:p>
+          <a:p>
+            <a:pPr lvl="0" marL="0" indent="0">
+              <a:buNone/>
+            </a:pPr>
+          </a:p>
+          <a:p>
+            <a:pPr lvl="0" marL="0" indent="0">
+              <a:spcBef>
+                <a:spcPts val="3000"/>
+              </a:spcBef>
+              <a:buNone/>
+            </a:pPr>
+            <a:r>
+              <a:rPr b="1"/>
+              <a:t>2. Add variable labels (if we can).</a:t>
+            </a:r>
+          </a:p>
+          <a:p>
+            <a:pPr lvl="0" marL="1270000" indent="0">
+              <a:buNone/>
+            </a:pPr>
+            <a:r>
+              <a:rPr sz="2000"/>
+              <a:t>We are unable to add informative labels to </a:t>
+            </a:r>
+            <a:r>
+              <a:rPr sz="2000" b="1"/>
+              <a:t>variables</a:t>
+            </a:r>
+            <a:r>
+              <a:rPr sz="2000"/>
+              <a:t> in Excel or Google Sheets.</a:t>
+            </a:r>
+          </a:p>
+          <a:p>
+            <a:pPr lvl="0" marL="0" indent="0">
+              <a:spcBef>
+                <a:spcPts val="3000"/>
+              </a:spcBef>
+              <a:buNone/>
+            </a:pPr>
+            <a:r>
+              <a:rPr b="1"/>
+              <a:t>3. Add value labels (if we can).</a:t>
+            </a:r>
+          </a:p>
+          <a:p>
+            <a:pPr lvl="0" marL="1270000" indent="0">
+              <a:buNone/>
+            </a:pPr>
+            <a:r>
+              <a:rPr sz="2000"/>
+              <a:t>We are unable to add informative labels to </a:t>
+            </a:r>
+            <a:r>
+              <a:rPr sz="2000" b="1"/>
+              <a:t>values</a:t>
+            </a:r>
+            <a:r>
+              <a:rPr sz="2000"/>
+              <a:t> in Excel or Google Sheets.</a:t>
+            </a:r>
+          </a:p>
+          <a:p>
+            <a:pPr lvl="0" marL="0" indent="0">
+              <a:spcBef>
+                <a:spcPts val="3000"/>
+              </a:spcBef>
+              <a:buNone/>
+            </a:pPr>
+            <a:r>
+              <a:rPr b="1"/>
+              <a:t>4. Recode outliers, values that are errors, or values that should be coded as missing.</a:t>
+            </a:r>
+          </a:p>
+          <a:p>
+            <a:pPr lvl="0" marL="1270000" indent="0">
+              <a:buNone/>
+            </a:pPr>
+            <a:r>
+              <a:rPr sz="2000"/>
+              <a:t>We are likely going to have to use </a:t>
+            </a:r>
+            <a:r>
+              <a:rPr sz="2000" b="1"/>
+              <a:t>find and replace</a:t>
+            </a:r>
+            <a:r>
+              <a:rPr sz="2000"/>
+              <a:t> to manually replace problematic values. For example, we will want to replace the </a:t>
+            </a:r>
+            <a:r>
+              <a:rPr sz="2000">
+                <a:latin typeface="Courier"/>
+              </a:rPr>
+              <a:t>200</a:t>
+            </a:r>
+            <a:r>
+              <a:rPr sz="2000"/>
+              <a:t> in the </a:t>
+            </a:r>
+            <a:r>
+              <a:rPr sz="2000">
+                <a:latin typeface="Courier"/>
+              </a:rPr>
+              <a:t>age</a:t>
+            </a:r>
+            <a:r>
+              <a:rPr sz="2000"/>
+              <a:t> column with a </a:t>
+            </a:r>
+            <a:r>
+              <a:rPr sz="2000">
+                <a:latin typeface="Courier"/>
+              </a:rPr>
+              <a:t>.</a:t>
+            </a:r>
+            <a:r>
+              <a:rPr sz="2000"/>
+              <a:t> or </a:t>
+            </a:r>
+            <a:r>
+              <a:rPr sz="2000">
+                <a:latin typeface="Courier"/>
+              </a:rPr>
+              <a:t>NA</a:t>
+            </a:r>
+            <a:r>
+              <a:rPr sz="2000"/>
+              <a:t> for missing. Similarly, we will want to replace the values of </a:t>
+            </a:r>
+            <a:r>
+              <a:rPr sz="2000">
+                <a:latin typeface="Courier"/>
+              </a:rPr>
+              <a:t>-99</a:t>
+            </a:r>
+            <a:r>
+              <a:rPr sz="2000"/>
+              <a:t> in the </a:t>
+            </a:r>
+            <a:r>
+              <a:rPr sz="2000">
+                <a:latin typeface="Courier"/>
+              </a:rPr>
+              <a:t>happy</a:t>
+            </a:r>
+            <a:r>
+              <a:rPr sz="2000"/>
+              <a:t> column with a </a:t>
+            </a:r>
+            <a:r>
+              <a:rPr sz="2000">
+                <a:latin typeface="Courier"/>
+              </a:rPr>
+              <a:t>.</a:t>
+            </a:r>
+            <a:r>
+              <a:rPr sz="2000"/>
+              <a:t> or </a:t>
+            </a:r>
+            <a:r>
+              <a:rPr sz="2000">
+                <a:latin typeface="Courier"/>
+              </a:rPr>
+              <a:t>NA</a:t>
+            </a:r>
+            <a:r>
+              <a:rPr sz="2000"/>
+              <a:t> for missing.</a:t>
+            </a:r>
+          </a:p>
+          <a:p>
+            <a:pPr lvl="0" marL="1270000" indent="0">
+              <a:buNone/>
+            </a:pPr>
+            <a:r>
+              <a:rPr sz="2000"/>
+              <a:t>For small data sets, this will not be difficult, but for larger data sets–especially data with many different kinds of values that need to be recoded–this process will become more difficult and cumbersome.</a:t>
+            </a:r>
+          </a:p>
+          <a:p>
+            <a:pPr lvl="0" marL="0" indent="0">
+              <a:spcBef>
+                <a:spcPts val="3000"/>
+              </a:spcBef>
+              <a:buNone/>
+            </a:pPr>
+            <a:r>
+              <a:rPr b="1"/>
+              <a:t>R</a:t>
+            </a:r>
+          </a:p>
+          <a:p>
+            <a:pPr lvl="0" marL="1270000" indent="0">
+              <a:buNone/>
+            </a:pPr>
+            <a:r>
+              <a:rPr sz="2000"/>
+              <a:t>Much of R’s functionality is accomplished through writing </a:t>
+            </a:r>
+            <a:r>
+              <a:rPr sz="2000" i="1"/>
+              <a:t>code</a:t>
+            </a:r>
+            <a:r>
+              <a:rPr sz="2000"/>
+              <a:t>, that is saved in a </a:t>
+            </a:r>
+            <a:r>
+              <a:rPr sz="2000" i="1"/>
+              <a:t>script</a:t>
+            </a:r>
+            <a:r>
+              <a:rPr sz="2000"/>
+              <a:t>. Notice how–as our tasks get more and more complicated–the saved script provides documentation for the decisions that we have made with the data.</a:t>
+            </a:r>
+          </a:p>
+          <a:p>
+            <a:pPr lvl="0" marL="0" indent="0">
+              <a:spcBef>
+                <a:spcPts val="3000"/>
+              </a:spcBef>
+              <a:buNone/>
+            </a:pPr>
+            <a:r>
+              <a:rPr b="1"/>
+              <a:t>1. Only keep the variables of interest.</a:t>
+            </a:r>
+          </a:p>
+          <a:p>
+            <a:pPr lvl="0" marL="1270000" indent="0">
+              <a:buNone/>
+            </a:pPr>
+            <a:r>
+              <a:rPr sz="2000"/>
+              <a:t>We can easily accomplish this with the </a:t>
+            </a:r>
+            <a:r>
+              <a:rPr sz="2000">
+                <a:latin typeface="Courier"/>
+              </a:rPr>
+              <a:t>subset</a:t>
+            </a:r>
+            <a:r>
+              <a:rPr sz="2000"/>
+              <a:t> function</a:t>
+            </a:r>
+          </a:p>
+          <a:p>
+            <a:pPr lvl="0" indent="0">
+              <a:buNone/>
+            </a:pPr>
+            <a:r>
+              <a:rPr>
+                <a:latin typeface="Courier"/>
+              </a:rPr>
+              <a:t>mynewdata </a:t>
+            </a:r>
+            <a:r>
+              <a:rPr>
+                <a:solidFill>
+                  <a:srgbClr val="007020"/>
+                </a:solidFill>
+                <a:latin typeface="Courier"/>
+              </a:rPr>
+              <a:t>&lt;-</a:t>
+            </a:r>
+            <a:r>
+              <a:rPr>
+                <a:latin typeface="Courier"/>
+              </a:rPr>
+              <a:t> </a:t>
+            </a:r>
+            <a:r>
+              <a:rPr>
+                <a:solidFill>
+                  <a:srgbClr val="06287E"/>
+                </a:solidFill>
+                <a:latin typeface="Courier"/>
+              </a:rPr>
+              <a:t>subset</a:t>
+            </a:r>
+            <a:r>
+              <a:rPr>
+                <a:latin typeface="Courier"/>
+              </a:rPr>
+              <a:t>(mydata,</a:t>
+            </a:r>
+            <a:br/>
+            <a:r>
+              <a:rPr>
+                <a:latin typeface="Courier"/>
+              </a:rPr>
+              <a:t>                    </a:t>
+            </a:r>
+            <a:r>
+              <a:rPr>
+                <a:solidFill>
+                  <a:srgbClr val="7D9029"/>
+                </a:solidFill>
+                <a:latin typeface="Courier"/>
+              </a:rPr>
+              <a:t>select =</a:t>
+            </a:r>
+            <a:r>
+              <a:rPr>
+                <a:latin typeface="Courier"/>
+              </a:rPr>
+              <a:t> </a:t>
+            </a:r>
+            <a:r>
+              <a:rPr>
+                <a:solidFill>
+                  <a:srgbClr val="06287E"/>
+                </a:solidFill>
+                <a:latin typeface="Courier"/>
+              </a:rPr>
+              <a:t>c</a:t>
+            </a:r>
+            <a:r>
+              <a:rPr>
+                <a:latin typeface="Courier"/>
+              </a:rPr>
+              <a:t>(id, age, happy))</a:t>
+            </a:r>
+          </a:p>
+          <a:p>
+            <a:pPr lvl="0" marL="0" indent="0">
+              <a:spcBef>
+                <a:spcPts val="3000"/>
+              </a:spcBef>
+              <a:buNone/>
+            </a:pPr>
+            <a:r>
+              <a:rPr b="1"/>
+              <a:t>2. Add variable labels (if we can).</a:t>
+            </a:r>
+          </a:p>
+          <a:p>
+            <a:pPr lvl="0" marL="1270000" indent="0">
+              <a:buNone/>
+            </a:pPr>
+            <a:r>
+              <a:rPr sz="2000"/>
+              <a:t>Adding </a:t>
+            </a:r>
+            <a:r>
+              <a:rPr sz="2000" i="1"/>
+              <a:t>variable labels</a:t>
+            </a:r>
+            <a:r>
+              <a:rPr sz="2000"/>
+              <a:t> is not well established in R. There are libraries that can add variable labels for some purposes, but not every library in R recognizes </a:t>
+            </a:r>
+            <a:r>
+              <a:rPr sz="2000" i="1"/>
+              <a:t>variable labels</a:t>
+            </a:r>
+            <a:r>
+              <a:rPr sz="2000"/>
+              <a:t>.</a:t>
+            </a:r>
+          </a:p>
+          <a:p>
+            <a:pPr lvl="0" marL="0" indent="0">
+              <a:spcBef>
+                <a:spcPts val="3000"/>
+              </a:spcBef>
+              <a:buNone/>
+            </a:pPr>
+            <a:r>
+              <a:rPr b="1"/>
+              <a:t>3. Add value labels (if we can).</a:t>
+            </a:r>
+          </a:p>
+          <a:p>
+            <a:pPr lvl="0" marL="1270000" indent="0">
+              <a:buNone/>
+            </a:pPr>
+            <a:r>
+              <a:rPr sz="2000"/>
+              <a:t>In contrast, </a:t>
+            </a:r>
+            <a:r>
+              <a:rPr sz="2000" i="1"/>
+              <a:t>value labels</a:t>
+            </a:r>
+            <a:r>
+              <a:rPr sz="2000"/>
+              <a:t> are straightforward in R, and can be accomplished by creating a </a:t>
+            </a:r>
+            <a:r>
+              <a:rPr sz="2000" i="1"/>
+              <a:t>factor variable</a:t>
+            </a:r>
+            <a:r>
+              <a:rPr sz="2000"/>
+              <a:t>. Below we demonstrate how to do this with the happy variable.</a:t>
+            </a:r>
+          </a:p>
+          <a:p>
+            <a:pPr lvl="0" indent="0">
+              <a:buNone/>
+            </a:pPr>
+            <a:r>
+              <a:rPr>
+                <a:latin typeface="Courier"/>
+              </a:rPr>
+              <a:t>mynewdata</a:t>
+            </a:r>
+            <a:r>
+              <a:rPr>
+                <a:solidFill>
+                  <a:srgbClr val="4070A0"/>
+                </a:solidFill>
+                <a:latin typeface="Courier"/>
+              </a:rPr>
+              <a:t>$</a:t>
+            </a:r>
+            <a:r>
+              <a:rPr>
+                <a:latin typeface="Courier"/>
+              </a:rPr>
+              <a:t>happyFACTOR </a:t>
+            </a:r>
+            <a:r>
+              <a:rPr>
+                <a:solidFill>
+                  <a:srgbClr val="007020"/>
+                </a:solidFill>
+                <a:latin typeface="Courier"/>
+              </a:rPr>
+              <a:t>&lt;-</a:t>
+            </a:r>
+            <a:r>
+              <a:rPr>
+                <a:latin typeface="Courier"/>
+              </a:rPr>
+              <a:t> </a:t>
+            </a:r>
+            <a:r>
+              <a:rPr>
+                <a:solidFill>
+                  <a:srgbClr val="06287E"/>
+                </a:solidFill>
+                <a:latin typeface="Courier"/>
+              </a:rPr>
+              <a:t>factor</a:t>
+            </a:r>
+            <a:r>
+              <a:rPr>
+                <a:latin typeface="Courier"/>
+              </a:rPr>
+              <a:t>(mynewdata</a:t>
+            </a:r>
+            <a:r>
+              <a:rPr>
+                <a:solidFill>
+                  <a:srgbClr val="4070A0"/>
+                </a:solidFill>
+                <a:latin typeface="Courier"/>
+              </a:rPr>
+              <a:t>$</a:t>
+            </a:r>
+            <a:r>
+              <a:rPr>
+                <a:latin typeface="Courier"/>
+              </a:rPr>
+              <a:t>happy,</a:t>
+            </a:r>
+            <a:br/>
+            <a:r>
+              <a:rPr>
+                <a:latin typeface="Courier"/>
+              </a:rPr>
+              <a:t>                             </a:t>
+            </a:r>
+            <a:r>
+              <a:rPr>
+                <a:solidFill>
+                  <a:srgbClr val="7D9029"/>
+                </a:solidFill>
+                <a:latin typeface="Courier"/>
+              </a:rPr>
+              <a:t>levels =</a:t>
+            </a:r>
+            <a:r>
+              <a:rPr>
+                <a:latin typeface="Courier"/>
+              </a:rPr>
+              <a:t> </a:t>
+            </a:r>
+            <a:r>
+              <a:rPr>
+                <a:solidFill>
+                  <a:srgbClr val="06287E"/>
+                </a:solidFill>
+                <a:latin typeface="Courier"/>
+              </a:rPr>
+              <a:t>c</a:t>
+            </a:r>
+            <a:r>
+              <a:rPr>
+                <a:latin typeface="Courier"/>
+              </a:rPr>
+              <a:t>(</a:t>
+            </a:r>
+            <a:r>
+              <a:rPr>
+                <a:solidFill>
+                  <a:srgbClr val="40A070"/>
+                </a:solidFill>
+                <a:latin typeface="Courier"/>
+              </a:rPr>
+              <a:t>1</a:t>
+            </a:r>
+            <a:r>
+              <a:rPr>
+                <a:latin typeface="Courier"/>
+              </a:rPr>
+              <a:t>, </a:t>
+            </a:r>
+            <a:r>
+              <a:rPr>
+                <a:solidFill>
+                  <a:srgbClr val="40A070"/>
+                </a:solidFill>
+                <a:latin typeface="Courier"/>
+              </a:rPr>
+              <a:t>2</a:t>
+            </a:r>
+            <a:r>
+              <a:rPr>
+                <a:latin typeface="Courier"/>
+              </a:rPr>
+              <a:t>, </a:t>
+            </a:r>
+            <a:r>
+              <a:rPr>
+                <a:solidFill>
+                  <a:srgbClr val="40A070"/>
+                </a:solidFill>
+                <a:latin typeface="Courier"/>
+              </a:rPr>
+              <a:t>3</a:t>
+            </a:r>
+            <a:r>
+              <a:rPr>
+                <a:latin typeface="Courier"/>
+              </a:rPr>
+              <a:t>, </a:t>
+            </a:r>
+            <a:r>
+              <a:rPr>
+                <a:solidFill>
+                  <a:srgbClr val="40A070"/>
+                </a:solidFill>
+                <a:latin typeface="Courier"/>
+              </a:rPr>
+              <a:t>4</a:t>
+            </a:r>
+            <a:r>
+              <a:rPr>
+                <a:latin typeface="Courier"/>
+              </a:rPr>
+              <a:t>, </a:t>
+            </a:r>
+            <a:r>
+              <a:rPr>
+                <a:solidFill>
+                  <a:srgbClr val="40A070"/>
+                </a:solidFill>
+                <a:latin typeface="Courier"/>
+              </a:rPr>
+              <a:t>5</a:t>
+            </a:r>
+            <a:r>
+              <a:rPr>
+                <a:latin typeface="Courier"/>
+              </a:rPr>
+              <a:t>),</a:t>
+            </a:r>
+            <a:br/>
+            <a:r>
+              <a:rPr>
+                <a:latin typeface="Courier"/>
+              </a:rPr>
+              <a:t>                             </a:t>
+            </a:r>
+            <a:r>
+              <a:rPr>
+                <a:solidFill>
+                  <a:srgbClr val="7D9029"/>
+                </a:solidFill>
+                <a:latin typeface="Courier"/>
+              </a:rPr>
+              <a:t>labels =</a:t>
+            </a:r>
+            <a:r>
+              <a:rPr>
+                <a:latin typeface="Courier"/>
+              </a:rPr>
+              <a:t> </a:t>
+            </a:r>
+            <a:r>
+              <a:rPr>
+                <a:solidFill>
+                  <a:srgbClr val="06287E"/>
+                </a:solidFill>
+                <a:latin typeface="Courier"/>
+              </a:rPr>
+              <a:t>c</a:t>
+            </a:r>
+            <a:r>
+              <a:rPr>
+                <a:latin typeface="Courier"/>
+              </a:rPr>
+              <a:t>(</a:t>
+            </a:r>
+            <a:r>
+              <a:rPr>
+                <a:solidFill>
+                  <a:srgbClr val="4070A0"/>
+                </a:solidFill>
+                <a:latin typeface="Courier"/>
+              </a:rPr>
+              <a:t>"Very Unhappy"</a:t>
+            </a:r>
+            <a:r>
+              <a:rPr>
+                <a:latin typeface="Courier"/>
+              </a:rPr>
+              <a:t>,</a:t>
+            </a:r>
+            <a:br/>
+            <a:r>
+              <a:rPr>
+                <a:latin typeface="Courier"/>
+              </a:rPr>
+              <a:t>                                        </a:t>
+            </a:r>
+            <a:r>
+              <a:rPr>
+                <a:solidFill>
+                  <a:srgbClr val="4070A0"/>
+                </a:solidFill>
+                <a:latin typeface="Courier"/>
+              </a:rPr>
+              <a:t>"Somewhat Unhappy"</a:t>
+            </a:r>
+            <a:r>
+              <a:rPr>
+                <a:latin typeface="Courier"/>
+              </a:rPr>
+              <a:t>,</a:t>
+            </a:r>
+            <a:br/>
+            <a:r>
+              <a:rPr>
+                <a:latin typeface="Courier"/>
+              </a:rPr>
+              <a:t>                                        </a:t>
+            </a:r>
+            <a:r>
+              <a:rPr>
+                <a:solidFill>
+                  <a:srgbClr val="4070A0"/>
+                </a:solidFill>
+                <a:latin typeface="Courier"/>
+              </a:rPr>
+              <a:t>"Neutral"</a:t>
+            </a:r>
+            <a:r>
+              <a:rPr>
+                <a:latin typeface="Courier"/>
+              </a:rPr>
+              <a:t>,</a:t>
+            </a:r>
+            <a:br/>
+            <a:r>
+              <a:rPr>
+                <a:latin typeface="Courier"/>
+              </a:rPr>
+              <a:t>                                        </a:t>
+            </a:r>
+            <a:r>
+              <a:rPr>
+                <a:solidFill>
+                  <a:srgbClr val="4070A0"/>
+                </a:solidFill>
+                <a:latin typeface="Courier"/>
+              </a:rPr>
+              <a:t>"Somewhat Happy"</a:t>
+            </a:r>
+            <a:r>
+              <a:rPr>
+                <a:latin typeface="Courier"/>
+              </a:rPr>
+              <a:t>,</a:t>
+            </a:r>
+            <a:br/>
+            <a:r>
+              <a:rPr>
+                <a:latin typeface="Courier"/>
+              </a:rPr>
+              <a:t>                                        </a:t>
+            </a:r>
+            <a:r>
+              <a:rPr>
+                <a:solidFill>
+                  <a:srgbClr val="4070A0"/>
+                </a:solidFill>
+                <a:latin typeface="Courier"/>
+              </a:rPr>
+              <a:t>"Very Happy"</a:t>
+            </a:r>
+            <a:r>
+              <a:rPr>
+                <a:latin typeface="Courier"/>
+              </a:rPr>
+              <a:t>))</a:t>
+            </a:r>
+          </a:p>
+          <a:p>
+            <a:pPr lvl="0" marL="0" indent="0">
+              <a:spcBef>
+                <a:spcPts val="3000"/>
+              </a:spcBef>
+              <a:buNone/>
+            </a:pPr>
+            <a:r>
+              <a:rPr b="1"/>
+              <a:t>4. Recode outliers, values that are errors, or values that should be coded as missing.</a:t>
+            </a:r>
+          </a:p>
+          <a:p>
+            <a:pPr lvl="0" marL="1270000" indent="0">
+              <a:buNone/>
+            </a:pPr>
+            <a:r>
+              <a:rPr sz="2000"/>
+              <a:t>We can easily accomplish this using Base R’s syntax for recoding: </a:t>
+            </a:r>
+            <a:r>
+              <a:rPr sz="2000">
+                <a:latin typeface="Courier"/>
+              </a:rPr>
+              <a:t>data$variable[rule] &lt;- newvalue</a:t>
+            </a:r>
+            <a:r>
+              <a:rPr sz="2000"/>
+              <a:t>.</a:t>
+            </a:r>
+          </a:p>
+          <a:p>
+            <a:pPr lvl="0" indent="0">
+              <a:buNone/>
+            </a:pPr>
+            <a:r>
+              <a:rPr>
+                <a:latin typeface="Courier"/>
+              </a:rPr>
+              <a:t>mynewdata</a:t>
+            </a:r>
+            <a:r>
+              <a:rPr>
+                <a:solidFill>
+                  <a:srgbClr val="4070A0"/>
+                </a:solidFill>
+                <a:latin typeface="Courier"/>
+              </a:rPr>
+              <a:t>$</a:t>
+            </a:r>
+            <a:r>
+              <a:rPr>
+                <a:latin typeface="Courier"/>
+              </a:rPr>
+              <a:t>age[mynewdata</a:t>
+            </a:r>
+            <a:r>
+              <a:rPr>
+                <a:solidFill>
+                  <a:srgbClr val="4070A0"/>
+                </a:solidFill>
+                <a:latin typeface="Courier"/>
+              </a:rPr>
+              <a:t>$</a:t>
+            </a:r>
+            <a:r>
+              <a:rPr>
+                <a:latin typeface="Courier"/>
+              </a:rPr>
+              <a:t>age </a:t>
+            </a:r>
+            <a:r>
+              <a:rPr>
+                <a:solidFill>
+                  <a:srgbClr val="4070A0"/>
+                </a:solidFill>
+                <a:latin typeface="Courier"/>
+              </a:rPr>
+              <a:t>&gt;=</a:t>
+            </a:r>
+            <a:r>
+              <a:rPr>
+                <a:latin typeface="Courier"/>
+              </a:rPr>
+              <a:t> </a:t>
+            </a:r>
+            <a:r>
+              <a:rPr>
+                <a:solidFill>
+                  <a:srgbClr val="40A070"/>
+                </a:solidFill>
+                <a:latin typeface="Courier"/>
+              </a:rPr>
+              <a:t>100</a:t>
+            </a:r>
+            <a:r>
+              <a:rPr>
+                <a:latin typeface="Courier"/>
+              </a:rPr>
+              <a:t>] </a:t>
+            </a:r>
+            <a:r>
+              <a:rPr>
+                <a:solidFill>
+                  <a:srgbClr val="007020"/>
+                </a:solidFill>
+                <a:latin typeface="Courier"/>
+              </a:rPr>
+              <a:t>&lt;-</a:t>
+            </a:r>
+            <a:r>
+              <a:rPr>
+                <a:latin typeface="Courier"/>
+              </a:rPr>
+              <a:t> </a:t>
+            </a:r>
+            <a:r>
+              <a:rPr>
+                <a:solidFill>
+                  <a:srgbClr val="880000"/>
+                </a:solidFill>
+                <a:latin typeface="Courier"/>
+              </a:rPr>
+              <a:t>NA</a:t>
+            </a:r>
+            <a:r>
+              <a:rPr>
+                <a:latin typeface="Courier"/>
+              </a:rPr>
+              <a:t> </a:t>
+            </a:r>
+            <a:r>
+              <a:rPr i="1">
+                <a:solidFill>
+                  <a:srgbClr val="60A0B0"/>
+                </a:solidFill>
+                <a:latin typeface="Courier"/>
+              </a:rPr>
+              <a:t># recode &gt; 100 to NA</a:t>
+            </a:r>
+            <a:br/>
+            <a:br/>
+            <a:r>
+              <a:rPr>
+                <a:latin typeface="Courier"/>
+              </a:rPr>
+              <a:t>mynewdata</a:t>
+            </a:r>
+            <a:r>
+              <a:rPr>
+                <a:solidFill>
+                  <a:srgbClr val="4070A0"/>
+                </a:solidFill>
+                <a:latin typeface="Courier"/>
+              </a:rPr>
+              <a:t>$</a:t>
+            </a:r>
+            <a:r>
+              <a:rPr>
+                <a:latin typeface="Courier"/>
+              </a:rPr>
+              <a:t>happy[mynewdata</a:t>
+            </a:r>
+            <a:r>
+              <a:rPr>
+                <a:solidFill>
+                  <a:srgbClr val="4070A0"/>
+                </a:solidFill>
+                <a:latin typeface="Courier"/>
+              </a:rPr>
+              <a:t>$</a:t>
+            </a:r>
+            <a:r>
+              <a:rPr>
+                <a:latin typeface="Courier"/>
+              </a:rPr>
+              <a:t>happy </a:t>
+            </a:r>
+            <a:r>
+              <a:rPr>
+                <a:solidFill>
+                  <a:srgbClr val="4070A0"/>
+                </a:solidFill>
+                <a:latin typeface="Courier"/>
+              </a:rPr>
+              <a:t>==</a:t>
+            </a:r>
+            <a:r>
+              <a:rPr>
+                <a:latin typeface="Courier"/>
+              </a:rPr>
+              <a:t> </a:t>
+            </a:r>
+            <a:r>
+              <a:rPr>
+                <a:solidFill>
+                  <a:srgbClr val="4070A0"/>
+                </a:solidFill>
+                <a:latin typeface="Courier"/>
+              </a:rPr>
+              <a:t>-</a:t>
+            </a:r>
+            <a:r>
+              <a:rPr>
+                <a:solidFill>
+                  <a:srgbClr val="40A070"/>
+                </a:solidFill>
+                <a:latin typeface="Courier"/>
+              </a:rPr>
+              <a:t>99</a:t>
+            </a:r>
+            <a:r>
+              <a:rPr>
+                <a:latin typeface="Courier"/>
+              </a:rPr>
+              <a:t>] </a:t>
+            </a:r>
+            <a:r>
+              <a:rPr>
+                <a:solidFill>
+                  <a:srgbClr val="007020"/>
+                </a:solidFill>
+                <a:latin typeface="Courier"/>
+              </a:rPr>
+              <a:t>&lt;-</a:t>
+            </a:r>
+            <a:r>
+              <a:rPr>
+                <a:latin typeface="Courier"/>
+              </a:rPr>
+              <a:t> </a:t>
+            </a:r>
+            <a:r>
+              <a:rPr>
+                <a:solidFill>
+                  <a:srgbClr val="880000"/>
+                </a:solidFill>
+                <a:latin typeface="Courier"/>
+              </a:rPr>
+              <a:t>NA</a:t>
+            </a:r>
+            <a:r>
+              <a:rPr>
+                <a:latin typeface="Courier"/>
+              </a:rPr>
+              <a:t> </a:t>
+            </a:r>
+            <a:r>
+              <a:rPr i="1">
+                <a:solidFill>
+                  <a:srgbClr val="60A0B0"/>
+                </a:solidFill>
+                <a:latin typeface="Courier"/>
+              </a:rPr>
+              <a:t># recode -99 to NA</a:t>
+            </a:r>
+          </a:p>
+          <a:p>
+            <a:pPr lvl="0" marL="0" indent="0">
+              <a:spcBef>
+                <a:spcPts val="3000"/>
+              </a:spcBef>
+              <a:buNone/>
+            </a:pPr>
+            <a:r>
+              <a:rPr b="1"/>
+              <a:t>Stata</a:t>
+            </a:r>
+          </a:p>
+          <a:p>
+            <a:pPr lvl="0" marL="0" indent="0">
+              <a:spcBef>
+                <a:spcPts val="3000"/>
+              </a:spcBef>
+              <a:buNone/>
+            </a:pPr>
+            <a:r>
+              <a:rPr b="1"/>
+              <a:t>1. Only keep the variables of interest.</a:t>
+            </a:r>
+          </a:p>
+          <a:p>
+            <a:pPr lvl="0" marL="1270000" indent="0">
+              <a:buNone/>
+            </a:pPr>
+            <a:r>
+              <a:rPr sz="2000"/>
+              <a:t>This is easily accomplished with Stata’s </a:t>
+            </a:r>
+            <a:r>
+              <a:rPr sz="2000">
+                <a:latin typeface="Courier"/>
+              </a:rPr>
+              <a:t>drop</a:t>
+            </a:r>
+            <a:r>
+              <a:rPr sz="2000"/>
+              <a:t> command. We could also choose to </a:t>
+            </a:r>
+            <a:r>
+              <a:rPr sz="2000">
+                <a:latin typeface="Courier"/>
+              </a:rPr>
+              <a:t>keep</a:t>
+            </a:r>
+            <a:r>
+              <a:rPr sz="2000"/>
+              <a:t> our variables of interest.</a:t>
+            </a:r>
+          </a:p>
+          <a:p>
+            <a:pPr lvl="0" indent="0">
+              <a:buNone/>
+            </a:pPr>
+            <a:br/>
+            <a:r>
+              <a:rPr b="1">
+                <a:solidFill>
+                  <a:srgbClr val="007020"/>
+                </a:solidFill>
+                <a:latin typeface="Courier"/>
+              </a:rPr>
+              <a:t>drop</a:t>
+            </a:r>
+            <a:r>
+              <a:rPr>
+                <a:latin typeface="Courier"/>
+              </a:rPr>
+              <a:t> somethingelse </a:t>
+            </a:r>
+            <a:r>
+              <a:rPr i="1">
+                <a:solidFill>
+                  <a:srgbClr val="60A0B0"/>
+                </a:solidFill>
+                <a:latin typeface="Courier"/>
+              </a:rPr>
+              <a:t>// drop extraneous variable(s)</a:t>
+            </a:r>
+          </a:p>
+          <a:p>
+            <a:pPr lvl="0" marL="0" indent="0">
+              <a:spcBef>
+                <a:spcPts val="3000"/>
+              </a:spcBef>
+              <a:buNone/>
+            </a:pPr>
+            <a:r>
+              <a:rPr b="1"/>
+              <a:t>2. Add variable labels (if we can).</a:t>
+            </a:r>
+          </a:p>
+          <a:p>
+            <a:pPr lvl="0" marL="1270000" indent="0">
+              <a:buNone/>
+            </a:pPr>
+            <a:r>
+              <a:rPr sz="2000"/>
+              <a:t>Variable labels can easily be added in Stata.</a:t>
+            </a:r>
+          </a:p>
+          <a:p>
+            <a:pPr lvl="0" indent="0">
+              <a:buNone/>
+            </a:pPr>
+            <a:br/>
+            <a:r>
+              <a:rPr b="1">
+                <a:solidFill>
+                  <a:srgbClr val="007020"/>
+                </a:solidFill>
+                <a:latin typeface="Courier"/>
+              </a:rPr>
+              <a:t>label</a:t>
+            </a:r>
+            <a:r>
+              <a:rPr>
+                <a:latin typeface="Courier"/>
+              </a:rPr>
+              <a:t> </a:t>
+            </a:r>
+            <a:r>
+              <a:rPr b="1">
+                <a:solidFill>
+                  <a:srgbClr val="007020"/>
+                </a:solidFill>
+                <a:latin typeface="Courier"/>
+              </a:rPr>
+              <a:t>variable</a:t>
+            </a:r>
+            <a:r>
+              <a:rPr>
+                <a:latin typeface="Courier"/>
+              </a:rPr>
+              <a:t> age </a:t>
+            </a:r>
+            <a:r>
+              <a:rPr>
+                <a:solidFill>
+                  <a:srgbClr val="4070A0"/>
+                </a:solidFill>
+                <a:latin typeface="Courier"/>
+              </a:rPr>
+              <a:t>"Respondent's Age'"</a:t>
+            </a:r>
+            <a:r>
+              <a:rPr>
+                <a:latin typeface="Courier"/>
+              </a:rPr>
+              <a:t> </a:t>
+            </a:r>
+            <a:r>
+              <a:rPr i="1">
+                <a:solidFill>
+                  <a:srgbClr val="60A0B0"/>
+                </a:solidFill>
+                <a:latin typeface="Courier"/>
+              </a:rPr>
+              <a:t>// variable label for age</a:t>
+            </a:r>
+            <a:br/>
+            <a:br/>
+            <a:r>
+              <a:rPr b="1">
+                <a:solidFill>
+                  <a:srgbClr val="007020"/>
+                </a:solidFill>
+                <a:latin typeface="Courier"/>
+              </a:rPr>
+              <a:t>label</a:t>
+            </a:r>
+            <a:r>
+              <a:rPr>
+                <a:latin typeface="Courier"/>
+              </a:rPr>
+              <a:t> </a:t>
+            </a:r>
+            <a:r>
+              <a:rPr b="1">
+                <a:solidFill>
+                  <a:srgbClr val="007020"/>
+                </a:solidFill>
+                <a:latin typeface="Courier"/>
+              </a:rPr>
+              <a:t>variable</a:t>
+            </a:r>
+            <a:r>
+              <a:rPr>
+                <a:latin typeface="Courier"/>
+              </a:rPr>
+              <a:t> happy </a:t>
+            </a:r>
+            <a:r>
+              <a:rPr>
+                <a:solidFill>
+                  <a:srgbClr val="4070A0"/>
+                </a:solidFill>
+                <a:latin typeface="Courier"/>
+              </a:rPr>
+              <a:t>"Happiness Score"</a:t>
+            </a:r>
+            <a:r>
+              <a:rPr>
+                <a:latin typeface="Courier"/>
+              </a:rPr>
+              <a:t> </a:t>
+            </a:r>
+            <a:r>
+              <a:rPr i="1">
+                <a:solidFill>
+                  <a:srgbClr val="60A0B0"/>
+                </a:solidFill>
+                <a:latin typeface="Courier"/>
+              </a:rPr>
+              <a:t>// variable label for happy</a:t>
+            </a:r>
+            <a:br/>
+            <a:br/>
+            <a:r>
+              <a:rPr b="1">
+                <a:solidFill>
+                  <a:srgbClr val="007020"/>
+                </a:solidFill>
+                <a:latin typeface="Courier"/>
+              </a:rPr>
+              <a:t>describe</a:t>
+            </a:r>
+            <a:r>
+              <a:rPr>
+                <a:latin typeface="Courier"/>
+              </a:rPr>
+              <a:t> </a:t>
+            </a:r>
+            <a:r>
+              <a:rPr i="1">
+                <a:solidFill>
+                  <a:srgbClr val="60A0B0"/>
+                </a:solidFill>
+                <a:latin typeface="Courier"/>
+              </a:rPr>
+              <a:t>// describe the data</a:t>
+            </a:r>
+            <a:br/>
+            <a:br/>
+            <a:r>
+              <a:rPr>
+                <a:latin typeface="Courier"/>
+              </a:rPr>
+              <a:t>Contains </a:t>
+            </a:r>
+            <a:r>
+              <a:rPr b="1">
+                <a:solidFill>
+                  <a:srgbClr val="007020"/>
+                </a:solidFill>
+                <a:latin typeface="Courier"/>
+              </a:rPr>
+              <a:t>data</a:t>
+            </a:r>
+            <a:r>
+              <a:rPr>
+                <a:latin typeface="Courier"/>
+              </a:rPr>
+              <a:t> from mydata.dta</a:t>
+            </a:r>
+            <a:br/>
+            <a:r>
+              <a:rPr>
+                <a:latin typeface="Courier"/>
+              </a:rPr>
+              <a:t> Observations:           100                             </a:t>
+            </a:r>
+            <a:br/>
+            <a:r>
+              <a:rPr>
+                <a:latin typeface="Courier"/>
+              </a:rPr>
+              <a:t>    Variables:             3                  </a:t>
+            </a:r>
+            <a:br/>
+            <a:r>
+              <a:rPr>
+                <a:latin typeface="Courier"/>
+              </a:rPr>
+              <a:t>------------------------------------------------------------------------------</a:t>
+            </a:r>
+            <a:br/>
+            <a:r>
+              <a:rPr>
+                <a:latin typeface="Courier"/>
+              </a:rPr>
+              <a:t>Variable      Storage   Display    Value</a:t>
+            </a:r>
+            <a:br/>
+            <a:r>
+              <a:rPr>
+                <a:latin typeface="Courier"/>
+              </a:rPr>
+              <a:t>    </a:t>
+            </a:r>
+            <a:r>
+              <a:rPr>
+                <a:solidFill>
+                  <a:srgbClr val="40A070"/>
+                </a:solidFill>
+                <a:latin typeface="Courier"/>
+              </a:rPr>
+              <a:t>name</a:t>
+            </a:r>
+            <a:r>
+              <a:rPr>
+                <a:latin typeface="Courier"/>
+              </a:rPr>
+              <a:t>         </a:t>
+            </a:r>
+            <a:r>
+              <a:rPr>
+                <a:solidFill>
+                  <a:srgbClr val="40A070"/>
+                </a:solidFill>
+                <a:latin typeface="Courier"/>
+              </a:rPr>
+              <a:t>type</a:t>
+            </a:r>
+            <a:r>
+              <a:rPr>
+                <a:latin typeface="Courier"/>
+              </a:rPr>
+              <a:t>    </a:t>
+            </a:r>
+            <a:r>
+              <a:rPr b="1">
+                <a:solidFill>
+                  <a:srgbClr val="007020"/>
+                </a:solidFill>
+                <a:latin typeface="Courier"/>
+              </a:rPr>
+              <a:t>format</a:t>
+            </a:r>
+            <a:r>
+              <a:rPr>
+                <a:latin typeface="Courier"/>
+              </a:rPr>
+              <a:t>    </a:t>
+            </a:r>
+            <a:r>
+              <a:rPr b="1">
+                <a:solidFill>
+                  <a:srgbClr val="007020"/>
+                </a:solidFill>
+                <a:latin typeface="Courier"/>
+              </a:rPr>
+              <a:t>label</a:t>
+            </a:r>
+            <a:r>
+              <a:rPr>
+                <a:latin typeface="Courier"/>
+              </a:rPr>
+              <a:t>      Variable </a:t>
+            </a:r>
+            <a:r>
+              <a:rPr b="1">
+                <a:solidFill>
+                  <a:srgbClr val="007020"/>
+                </a:solidFill>
+                <a:latin typeface="Courier"/>
+              </a:rPr>
+              <a:t>label</a:t>
+            </a:r>
+            <a:br/>
+            <a:r>
+              <a:rPr>
+                <a:latin typeface="Courier"/>
+              </a:rPr>
+              <a:t>------------------------------------------------------------------------------</a:t>
+            </a:r>
+            <a:br/>
+            <a:r>
+              <a:rPr>
+                <a:latin typeface="Courier"/>
+              </a:rPr>
+              <a:t>id              </a:t>
+            </a:r>
+            <a:r>
+              <a:rPr b="1">
+                <a:solidFill>
+                  <a:srgbClr val="007020"/>
+                </a:solidFill>
+                <a:latin typeface="Courier"/>
+              </a:rPr>
+              <a:t>long</a:t>
+            </a:r>
+            <a:r>
+              <a:rPr>
+                <a:latin typeface="Courier"/>
+              </a:rPr>
+              <a:t>    %9.0g                 id</a:t>
+            </a:r>
+            <a:br/>
+            <a:r>
+              <a:rPr>
+                <a:latin typeface="Courier"/>
+              </a:rPr>
+              <a:t>age             </a:t>
+            </a:r>
+            <a:r>
+              <a:rPr b="1">
+                <a:solidFill>
+                  <a:srgbClr val="007020"/>
+                </a:solidFill>
+                <a:latin typeface="Courier"/>
+              </a:rPr>
+              <a:t>double</a:t>
+            </a:r>
+            <a:r>
+              <a:rPr>
+                <a:latin typeface="Courier"/>
+              </a:rPr>
+              <a:t>  %9.0g                 Respondent's Age'</a:t>
+            </a:r>
+            <a:br/>
+            <a:r>
+              <a:rPr>
+                <a:latin typeface="Courier"/>
+              </a:rPr>
+              <a:t>happy           </a:t>
+            </a:r>
+            <a:r>
+              <a:rPr b="1">
+                <a:solidFill>
+                  <a:srgbClr val="007020"/>
+                </a:solidFill>
+                <a:latin typeface="Courier"/>
+              </a:rPr>
+              <a:t>double</a:t>
+            </a:r>
+            <a:r>
+              <a:rPr>
+                <a:latin typeface="Courier"/>
+              </a:rPr>
+              <a:t>  %9.0g                 Happiness Score</a:t>
+            </a:r>
+            <a:br/>
+            <a:r>
+              <a:rPr>
+                <a:latin typeface="Courier"/>
+              </a:rPr>
+              <a:t>------------------------------------------------------------------------------</a:t>
+            </a:r>
+          </a:p>
+          <a:p>
+            <a:pPr lvl="0" marL="0" indent="0">
+              <a:spcBef>
+                <a:spcPts val="3000"/>
+              </a:spcBef>
+              <a:buNone/>
+            </a:pPr>
+            <a:r>
+              <a:rPr b="1"/>
+              <a:t>Add value labels (if we can)</a:t>
+            </a:r>
+          </a:p>
+          <a:p>
+            <a:pPr lvl="0" marL="1270000" indent="0">
+              <a:buNone/>
+            </a:pPr>
+            <a:r>
+              <a:rPr sz="2000"/>
+              <a:t>Value labels are a natural part of Stata.</a:t>
+            </a:r>
+          </a:p>
+          <a:p>
+            <a:pPr lvl="0" indent="0">
+              <a:buNone/>
+            </a:pPr>
+            <a:br/>
+            <a:r>
+              <a:rPr b="1">
+                <a:solidFill>
+                  <a:srgbClr val="007020"/>
+                </a:solidFill>
+                <a:latin typeface="Courier"/>
+              </a:rPr>
+              <a:t>label</a:t>
+            </a:r>
+            <a:r>
+              <a:rPr>
+                <a:latin typeface="Courier"/>
+              </a:rPr>
+              <a:t> </a:t>
+            </a:r>
+            <a:r>
+              <a:rPr b="1">
+                <a:solidFill>
+                  <a:srgbClr val="007020"/>
+                </a:solidFill>
+                <a:latin typeface="Courier"/>
+              </a:rPr>
+              <a:t>define</a:t>
+            </a:r>
+            <a:r>
+              <a:rPr>
+                <a:latin typeface="Courier"/>
+              </a:rPr>
+              <a:t> happy </a:t>
+            </a:r>
+            <a:r>
+              <a:rPr i="1">
+                <a:solidFill>
+                  <a:srgbClr val="60A0B0"/>
+                </a:solidFill>
+                <a:latin typeface="Courier"/>
+              </a:rPr>
+              <a:t>/// create value label for happy</a:t>
+            </a:r>
+            <a:br/>
+            <a:r>
+              <a:rPr>
+                <a:latin typeface="Courier"/>
+              </a:rPr>
+              <a:t>5 </a:t>
+            </a:r>
+            <a:r>
+              <a:rPr>
+                <a:solidFill>
+                  <a:srgbClr val="4070A0"/>
+                </a:solidFill>
+                <a:latin typeface="Courier"/>
+              </a:rPr>
+              <a:t>"Very Unhappy"</a:t>
+            </a:r>
+            <a:r>
+              <a:rPr>
+                <a:latin typeface="Courier"/>
+              </a:rPr>
+              <a:t> </a:t>
+            </a:r>
+            <a:r>
+              <a:rPr i="1">
+                <a:solidFill>
+                  <a:srgbClr val="60A0B0"/>
+                </a:solidFill>
+                <a:latin typeface="Courier"/>
+              </a:rPr>
+              <a:t>///</a:t>
+            </a:r>
+            <a:br/>
+            <a:r>
+              <a:rPr>
+                <a:latin typeface="Courier"/>
+              </a:rPr>
+              <a:t>4 </a:t>
+            </a:r>
+            <a:r>
+              <a:rPr>
+                <a:solidFill>
+                  <a:srgbClr val="4070A0"/>
+                </a:solidFill>
+                <a:latin typeface="Courier"/>
+              </a:rPr>
+              <a:t>"Somewhat Unhappy"</a:t>
+            </a:r>
+            <a:r>
+              <a:rPr>
+                <a:latin typeface="Courier"/>
+              </a:rPr>
+              <a:t> </a:t>
+            </a:r>
+            <a:r>
+              <a:rPr i="1">
+                <a:solidFill>
+                  <a:srgbClr val="60A0B0"/>
+                </a:solidFill>
+                <a:latin typeface="Courier"/>
+              </a:rPr>
+              <a:t>///</a:t>
+            </a:r>
+            <a:br/>
+            <a:r>
+              <a:rPr>
+                <a:latin typeface="Courier"/>
+              </a:rPr>
+              <a:t>3 </a:t>
+            </a:r>
+            <a:r>
+              <a:rPr>
+                <a:solidFill>
+                  <a:srgbClr val="4070A0"/>
+                </a:solidFill>
+                <a:latin typeface="Courier"/>
+              </a:rPr>
+              <a:t>"Neutral"</a:t>
+            </a:r>
+            <a:r>
+              <a:rPr>
+                <a:latin typeface="Courier"/>
+              </a:rPr>
+              <a:t> </a:t>
+            </a:r>
+            <a:r>
+              <a:rPr i="1">
+                <a:solidFill>
+                  <a:srgbClr val="60A0B0"/>
+                </a:solidFill>
+                <a:latin typeface="Courier"/>
+              </a:rPr>
+              <a:t>///</a:t>
+            </a:r>
+            <a:br/>
+            <a:r>
+              <a:rPr>
+                <a:latin typeface="Courier"/>
+              </a:rPr>
+              <a:t>2 </a:t>
+            </a:r>
+            <a:r>
+              <a:rPr>
+                <a:solidFill>
+                  <a:srgbClr val="4070A0"/>
+                </a:solidFill>
+                <a:latin typeface="Courier"/>
+              </a:rPr>
+              <a:t>"Somewhat Happy"</a:t>
+            </a:r>
+            <a:r>
+              <a:rPr>
+                <a:latin typeface="Courier"/>
+              </a:rPr>
+              <a:t> </a:t>
+            </a:r>
+            <a:r>
+              <a:rPr i="1">
+                <a:solidFill>
+                  <a:srgbClr val="60A0B0"/>
+                </a:solidFill>
+                <a:latin typeface="Courier"/>
+              </a:rPr>
+              <a:t>///</a:t>
+            </a:r>
+            <a:br/>
+            <a:r>
+              <a:rPr>
+                <a:latin typeface="Courier"/>
+              </a:rPr>
+              <a:t>1 </a:t>
+            </a:r>
+            <a:r>
+              <a:rPr>
+                <a:solidFill>
+                  <a:srgbClr val="4070A0"/>
+                </a:solidFill>
+                <a:latin typeface="Courier"/>
+              </a:rPr>
+              <a:t>"Very Happy"</a:t>
+            </a:r>
+            <a:br/>
+            <a:br/>
+            <a:r>
+              <a:rPr b="1">
+                <a:solidFill>
+                  <a:srgbClr val="007020"/>
+                </a:solidFill>
+                <a:latin typeface="Courier"/>
+              </a:rPr>
+              <a:t>label</a:t>
+            </a:r>
+            <a:r>
+              <a:rPr>
+                <a:latin typeface="Courier"/>
+              </a:rPr>
+              <a:t> </a:t>
+            </a:r>
+            <a:r>
+              <a:rPr b="1">
+                <a:solidFill>
+                  <a:srgbClr val="007020"/>
+                </a:solidFill>
+                <a:latin typeface="Courier"/>
+              </a:rPr>
+              <a:t>values</a:t>
+            </a:r>
+            <a:r>
+              <a:rPr>
+                <a:latin typeface="Courier"/>
+              </a:rPr>
+              <a:t> happy happy </a:t>
+            </a:r>
+            <a:r>
+              <a:rPr i="1">
+                <a:solidFill>
+                  <a:srgbClr val="60A0B0"/>
+                </a:solidFill>
+                <a:latin typeface="Courier"/>
+              </a:rPr>
+              <a:t>// assign value label happy to variable happy </a:t>
+            </a:r>
+            <a:br/>
+            <a:br/>
+            <a:r>
+              <a:rPr>
+                <a:solidFill>
+                  <a:srgbClr val="007020"/>
+                </a:solidFill>
+                <a:latin typeface="Courier"/>
+              </a:rPr>
+              <a:t>list</a:t>
+            </a:r>
+            <a:r>
+              <a:rPr>
+                <a:latin typeface="Courier"/>
+              </a:rPr>
+              <a:t> </a:t>
+            </a:r>
+            <a:r>
+              <a:rPr b="1">
+                <a:solidFill>
+                  <a:srgbClr val="007020"/>
+                </a:solidFill>
+                <a:latin typeface="Courier"/>
+              </a:rPr>
+              <a:t>in</a:t>
+            </a:r>
+            <a:r>
+              <a:rPr>
+                <a:latin typeface="Courier"/>
+              </a:rPr>
+              <a:t> 1/10 </a:t>
+            </a:r>
+            <a:r>
+              <a:rPr i="1">
+                <a:solidFill>
+                  <a:srgbClr val="60A0B0"/>
+                </a:solidFill>
+                <a:latin typeface="Courier"/>
+              </a:rPr>
+              <a:t>// list first 10 lines of data</a:t>
+            </a:r>
+            <a:br/>
+            <a:br/>
+            <a:r>
+              <a:rPr>
+                <a:latin typeface="Courier"/>
+              </a:rPr>
+              <a:t>     +----------------------------------+</a:t>
+            </a:r>
+            <a:br/>
+            <a:r>
+              <a:rPr>
+                <a:latin typeface="Courier"/>
+              </a:rPr>
+              <a:t>     | id        age              happy |</a:t>
+            </a:r>
+            <a:br/>
+            <a:r>
+              <a:rPr>
+                <a:latin typeface="Courier"/>
+              </a:rPr>
+              <a:t>     |----------------------------------|</a:t>
+            </a:r>
+            <a:br/>
+            <a:r>
+              <a:rPr>
+                <a:latin typeface="Courier"/>
+              </a:rPr>
+              <a:t>  1. |  1   45.23996                -99 |</a:t>
+            </a:r>
+            <a:br/>
+            <a:r>
+              <a:rPr>
+                <a:latin typeface="Courier"/>
+              </a:rPr>
+              <a:t>  2. |  2        200     Somewhat Happy |</a:t>
+            </a:r>
+            <a:br/>
+            <a:r>
+              <a:rPr>
+                <a:latin typeface="Courier"/>
+              </a:rPr>
+              <a:t>  3. |  3   58.39718                -99 |</a:t>
+            </a:r>
+            <a:br/>
+            <a:r>
+              <a:rPr>
+                <a:latin typeface="Courier"/>
+              </a:rPr>
+              <a:t>  4. |  4   46.66829     Somewhat Happy |</a:t>
+            </a:r>
+            <a:br/>
+            <a:r>
+              <a:rPr>
+                <a:latin typeface="Courier"/>
+              </a:rPr>
+              <a:t>  5. |  5   48.58828     Somewhat Happy |</a:t>
+            </a:r>
+            <a:br/>
+            <a:r>
+              <a:rPr>
+                <a:latin typeface="Courier"/>
+              </a:rPr>
+              <a:t>     |----------------------------------|</a:t>
+            </a:r>
+            <a:br/>
+            <a:r>
+              <a:rPr>
+                <a:latin typeface="Courier"/>
+              </a:rPr>
+              <a:t>  6. |  6   41.52565   Somewhat Unhappy |</a:t>
+            </a:r>
+            <a:br/>
+            <a:r>
+              <a:rPr>
+                <a:latin typeface="Courier"/>
+              </a:rPr>
+              <a:t>  7. |  7   45.49311            Neutral |</a:t>
+            </a:r>
+            <a:br/>
+            <a:r>
+              <a:rPr>
+                <a:latin typeface="Courier"/>
+              </a:rPr>
+              <a:t>  8. |  8    50.7754     Somewhat Happy |</a:t>
+            </a:r>
+            <a:br/>
+            <a:r>
+              <a:rPr>
+                <a:latin typeface="Courier"/>
+              </a:rPr>
+              <a:t>  9. |  9   51.39233   Somewhat Unhappy |</a:t>
+            </a:r>
+            <a:br/>
+            <a:r>
+              <a:rPr>
+                <a:latin typeface="Courier"/>
+              </a:rPr>
+              <a:t> 10. | 10   44.55724     Somewhat Happy |</a:t>
+            </a:r>
+            <a:br/>
+            <a:r>
+              <a:rPr>
+                <a:latin typeface="Courier"/>
+              </a:rPr>
+              <a:t>     +----------------------------------+</a:t>
+            </a:r>
+          </a:p>
+          <a:p>
+            <a:pPr lvl="0" marL="0" indent="0">
+              <a:spcBef>
+                <a:spcPts val="3000"/>
+              </a:spcBef>
+              <a:buNone/>
+            </a:pPr>
+            <a:r>
+              <a:rPr b="1"/>
+              <a:t>4. Recode outliers, values that are errors, or values that should be coded as missing</a:t>
+            </a:r>
+          </a:p>
+          <a:p>
+            <a:pPr lvl="0" indent="0">
+              <a:buNone/>
+            </a:pPr>
+            <a:br/>
+            <a:r>
+              <a:rPr b="1">
+                <a:solidFill>
+                  <a:srgbClr val="007020"/>
+                </a:solidFill>
+                <a:latin typeface="Courier"/>
+              </a:rPr>
+              <a:t>recode</a:t>
+            </a:r>
+            <a:r>
+              <a:rPr>
+                <a:latin typeface="Courier"/>
+              </a:rPr>
+              <a:t> age (100 / </a:t>
+            </a:r>
+            <a:r>
+              <a:rPr>
+                <a:solidFill>
+                  <a:srgbClr val="06287E"/>
+                </a:solidFill>
+                <a:latin typeface="Courier"/>
+              </a:rPr>
+              <a:t>max</a:t>
+            </a:r>
+            <a:r>
+              <a:rPr>
+                <a:latin typeface="Courier"/>
+              </a:rPr>
+              <a:t> = .) </a:t>
+            </a:r>
+            <a:r>
+              <a:rPr i="1">
+                <a:solidFill>
+                  <a:srgbClr val="60A0B0"/>
+                </a:solidFill>
+                <a:latin typeface="Courier"/>
+              </a:rPr>
+              <a:t>// recode ages &gt; 100</a:t>
+            </a:r>
+          </a:p>
+          <a:p>
+            <a:pPr lvl="0" indent="0">
+              <a:buNone/>
+            </a:pPr>
+            <a:br/>
+            <a:r>
+              <a:rPr b="1">
+                <a:solidFill>
+                  <a:srgbClr val="007020"/>
+                </a:solidFill>
+                <a:latin typeface="Courier"/>
+              </a:rPr>
+              <a:t>recode</a:t>
+            </a:r>
+            <a:r>
+              <a:rPr>
+                <a:latin typeface="Courier"/>
+              </a:rPr>
+              <a:t> happy (-99 = .) </a:t>
+            </a:r>
+            <a:r>
+              <a:rPr i="1">
+                <a:solidFill>
+                  <a:srgbClr val="60A0B0"/>
+                </a:solidFill>
+                <a:latin typeface="Courier"/>
+              </a:rPr>
+              <a:t>// recode -99 to missing</a:t>
+            </a:r>
+          </a:p>
+          <a:p>
+            <a:pPr lvl="0" indent="0">
+              <a:buNone/>
+            </a:pPr>
+            <a:br/>
+            <a:r>
+              <a:rPr>
+                <a:solidFill>
+                  <a:srgbClr val="007020"/>
+                </a:solidFill>
+                <a:latin typeface="Courier"/>
+              </a:rPr>
+              <a:t>list</a:t>
+            </a:r>
+            <a:r>
+              <a:rPr>
+                <a:latin typeface="Courier"/>
+              </a:rPr>
+              <a:t> </a:t>
+            </a:r>
+            <a:r>
+              <a:rPr b="1">
+                <a:solidFill>
+                  <a:srgbClr val="007020"/>
+                </a:solidFill>
+                <a:latin typeface="Courier"/>
+              </a:rPr>
+              <a:t>in</a:t>
+            </a:r>
+            <a:r>
+              <a:rPr>
+                <a:latin typeface="Courier"/>
+              </a:rPr>
+              <a:t> 1/10 </a:t>
+            </a:r>
+            <a:r>
+              <a:rPr i="1">
+                <a:solidFill>
+                  <a:srgbClr val="60A0B0"/>
+                </a:solidFill>
+                <a:latin typeface="Courier"/>
+              </a:rPr>
+              <a:t>// list first 10 lines of data</a:t>
+            </a:r>
+            <a:br/>
+            <a:br/>
+            <a:r>
+              <a:rPr>
+                <a:latin typeface="Courier"/>
+              </a:rPr>
+              <a:t>     +-----------------------+</a:t>
+            </a:r>
+            <a:br/>
+            <a:r>
+              <a:rPr>
+                <a:latin typeface="Courier"/>
+              </a:rPr>
+              <a:t>     | id        age   happy |</a:t>
+            </a:r>
+            <a:br/>
+            <a:r>
+              <a:rPr>
+                <a:latin typeface="Courier"/>
+              </a:rPr>
+              <a:t>     |-----------------------|</a:t>
+            </a:r>
+            <a:br/>
+            <a:r>
+              <a:rPr>
+                <a:latin typeface="Courier"/>
+              </a:rPr>
+              <a:t>  1. |  1   70.12533       . |</a:t>
+            </a:r>
+            <a:br/>
+            <a:r>
+              <a:rPr>
+                <a:latin typeface="Courier"/>
+              </a:rPr>
+              <a:t>  2. |  2          .       1 |</a:t>
+            </a:r>
+            <a:br/>
+            <a:r>
+              <a:rPr>
+                <a:latin typeface="Courier"/>
+              </a:rPr>
+              <a:t>  3. |  3   69.25009       . |</a:t>
+            </a:r>
+            <a:br/>
+            <a:r>
+              <a:rPr>
+                <a:latin typeface="Courier"/>
+              </a:rPr>
+              <a:t>  4. |  4   68.52247       2 |</a:t>
+            </a:r>
+            <a:br/>
+            <a:r>
+              <a:rPr>
+                <a:latin typeface="Courier"/>
+              </a:rPr>
+              <a:t>  5. |  5   38.60395       4 |</a:t>
+            </a:r>
+            <a:br/>
+            <a:r>
+              <a:rPr>
+                <a:latin typeface="Courier"/>
+              </a:rPr>
+              <a:t>     |-----------------------|</a:t>
+            </a:r>
+            <a:br/>
+            <a:r>
+              <a:rPr>
+                <a:latin typeface="Courier"/>
+              </a:rPr>
+              <a:t>  6. |  6    39.7724       1 |</a:t>
+            </a:r>
+            <a:br/>
+            <a:r>
+              <a:rPr>
+                <a:latin typeface="Courier"/>
+              </a:rPr>
+              <a:t>  7. |  7   49.59346       4 |</a:t>
+            </a:r>
+            <a:br/>
+            <a:r>
+              <a:rPr>
+                <a:latin typeface="Courier"/>
+              </a:rPr>
+              <a:t>  8. |  8   61.26781       1 |</a:t>
+            </a:r>
+            <a:br/>
+            <a:r>
+              <a:rPr>
+                <a:latin typeface="Courier"/>
+              </a:rPr>
+              <a:t>  9. |  9   34.73179       4 |</a:t>
+            </a:r>
+            <a:br/>
+            <a:r>
+              <a:rPr>
+                <a:latin typeface="Courier"/>
+              </a:rPr>
+              <a:t> 10. | 10   60.76342       1 |</a:t>
+            </a:r>
+            <a:br/>
+            <a:r>
+              <a:rPr>
+                <a:latin typeface="Courier"/>
+              </a:rPr>
+              <a:t>     +-----------------------+</a:t>
+            </a:r>
+            <a:br/>
+            <a:r>
+              <a:rPr>
+                <a:latin typeface="Courier"/>
+              </a:rPr>
+              <a:t>  </a:t>
+            </a:r>
+          </a:p>
+        </p:txBody>
+      </p:sp>
+    </p:spTree>
+  </p:cSld>
+</p:sld>
+</file>
+
+<file path=ppt/slides/slide13.xml><?xml version="1.0" encoding="utf-8"?>
+<p:sld xmlns:a="http://schemas.openxmlformats.org/drawingml/2006/main" xmlns:r="http://schemas.openxmlformats.org/officeDocument/2006/relationships" xmlns:p="http://schemas.openxmlformats.org/presentationml/2006/main">
+  <p:cSld>
+    <p:spTree>
+      <p:nvGrpSpPr>
+        <p:cNvPr id="1" name=""/>
+        <p:cNvGrpSpPr/>
+        <p:nvPr/>
+      </p:nvGrpSpPr>
+      <p:grpSpPr>
+        <a:xfrm>
+          <a:off x="0" y="0"/>
+          <a:ext cx="0" cy="0"/>
+          <a:chOff x="0" y="0"/>
+          <a:chExt cx="0" cy="0"/>
+        </a:xfrm>
+      </p:grpSpPr>
+      <p:sp>
+        <p:nvSpPr>
+          <p:cNvPr id="2" name="Title 1"/>
+          <p:cNvSpPr>
+            <a:spLocks noGrp="1"/>
+          </p:cNvSpPr>
+          <p:nvPr>
+            <p:ph type="title"/>
+          </p:nvPr>
+        </p:nvSpPr>
+        <p:spPr>
+          <a:xfrm>
+            <a:off x="722313" y="4406900"/>
+            <a:ext cx="7772400" cy="1362075"/>
+          </a:xfrm>
+        </p:spPr>
+        <p:txBody>
+          <a:bodyPr/>
+          <a:lstStyle/>
+          <a:p>
+            <a:pPr lvl="0" marL="0" indent="0">
+              <a:buNone/>
+            </a:pPr>
+            <a:r>
+              <a:rPr/>
+              <a:t>Simple</a:t>
+            </a:r>
+            <a:r>
+              <a:rPr/>
+              <a:t> </a:t>
+            </a:r>
+            <a:r>
+              <a:rPr/>
+              <a:t>Analysis</a:t>
             </a:r>
           </a:p>
         </p:txBody>
@@ -3281,7 +5709,7 @@
               <a:rPr>
                 <a:hlinkClick r:id="rId2" action="ppaction://hlinksldjump"/>
               </a:rPr>
-              <a:t>Publicly Available Tools for Analysis</a:t>
+              <a:t>Introduction</a:t>
             </a:r>
           </a:p>
           <a:p>
@@ -3290,6 +5718,24 @@
               <a:rPr>
                 <a:hlinkClick r:id="rId3" action="ppaction://hlinksldjump"/>
               </a:rPr>
+              <a:t>Some Tools for Analysis</a:t>
+            </a:r>
+          </a:p>
+          <a:p>
+            <a:pPr lvl="1"/>
+            <a:r>
+              <a:rPr>
+                <a:hlinkClick r:id="rId4" action="ppaction://hlinksldjump"/>
+              </a:rPr>
+              <a:t>Our Data</a:t>
+            </a:r>
+          </a:p>
+          <a:p>
+            <a:pPr lvl="1"/>
+            <a:r>
+              <a:rPr>
+                <a:hlinkClick r:id="rId5" action="ppaction://hlinksldjump"/>
+              </a:rPr>
               <a:t>Cleaning Data</a:t>
             </a:r>
           </a:p>
@@ -3297,7 +5743,7 @@
             <a:pPr lvl="1"/>
             <a:r>
               <a:rPr>
-                <a:hlinkClick r:id="rId4" action="ppaction://hlinksldjump"/>
+                <a:hlinkClick r:id="rId6" action="ppaction://hlinksldjump"/>
               </a:rPr>
               <a:t>Simple Analysis</a:t>
             </a:r>
@@ -3336,7 +5782,12 @@
             <p:ph type="title"/>
           </p:nvPr>
         </p:nvSpPr>
-        <p:spPr/>
+        <p:spPr>
+          <a:xfrm>
+            <a:off x="722313" y="4406900"/>
+            <a:ext cx="7772400" cy="1362075"/>
+          </a:xfrm>
+        </p:spPr>
         <p:txBody>
           <a:bodyPr/>
           <a:lstStyle/>
@@ -3346,712 +5797,11 @@
             </a:pPr>
             <a:r>
               <a:rPr/>
-              <a:t>Publicly</a:t>
-            </a:r>
-            <a:r>
-              <a:rPr/>
-              <a:t> </a:t>
-            </a:r>
-            <a:r>
-              <a:rPr/>
-              <a:t>Available</a:t>
-            </a:r>
-            <a:r>
-              <a:rPr/>
-              <a:t> </a:t>
-            </a:r>
-            <a:r>
-              <a:rPr/>
-              <a:t>Tools</a:t>
-            </a:r>
-            <a:r>
-              <a:rPr/>
-              <a:t> </a:t>
-            </a:r>
-            <a:r>
-              <a:rPr/>
-              <a:t>for</a:t>
-            </a:r>
-            <a:r>
-              <a:rPr/>
-              <a:t> </a:t>
-            </a:r>
-            <a:r>
-              <a:rPr/>
-              <a:t>Analysis</a:t>
+              <a:t>Introduction</a:t>
             </a:r>
           </a:p>
         </p:txBody>
       </p:sp>
-      <p:graphicFrame>
-        <p:nvGraphicFramePr>
-          <p:cNvPr id="6" name="Content Placeholder 5"/>
-          <p:cNvGraphicFramePr>
-            <a:graphicFrameLocks noGrp="1"/>
-          </p:cNvGraphicFramePr>
-          <p:nvPr>
-            <p:ph idx="1"/>
-          </p:nvPr>
-        </p:nvGraphicFramePr>
-        <p:xfrm>
-          <a:off x="457200" y="1600200"/>
-          <a:ext cx="8229600" cy="4521200"/>
-        </p:xfrm>
-        <a:graphic>
-          <a:graphicData uri="http://schemas.openxmlformats.org/drawingml/2006/table">
-            <a:tbl>
-              <a:tblPr firstRow="1" bandRow="1">
-                <a:tableStyleId>{5C22544A-7EE6-4342-B048-85BDC9FD1C3A}</a:tableStyleId>
-              </a:tblPr>
-              <a:tblGrid>
-                <a:gridCol w="1638300"/>
-                <a:gridCol w="1638300"/>
-                <a:gridCol w="1638300"/>
-                <a:gridCol w="1638300"/>
-                <a:gridCol w="1638300"/>
-              </a:tblGrid>
-              <a:tr h="0">
-                <a:tc>
-                  <a:txBody>
-                    <a:bodyPr/>
-                    <a:lstStyle/>
-                    <a:p>
-                      <a:pPr lvl="0" marL="0" indent="0" algn="l">
-                        <a:buNone/>
-                      </a:pPr>
-                      <a:r>
-                        <a:rPr/>
-                        <a:t>Tool</a:t>
-                      </a:r>
-                    </a:p>
-                  </a:txBody>
-                  <a:tcPr/>
-                </a:tc>
-                <a:tc>
-                  <a:txBody>
-                    <a:bodyPr/>
-                    <a:lstStyle/>
-                    <a:p>
-                      <a:pPr lvl="0" marL="0" indent="0" algn="l">
-                        <a:buNone/>
-                      </a:pPr>
-                      <a:r>
-                        <a:rPr/>
-                        <a:t>Cost</a:t>
-                      </a:r>
-                    </a:p>
-                  </a:txBody>
-                  <a:tcPr/>
-                </a:tc>
-                <a:tc>
-                  <a:txBody>
-                    <a:bodyPr/>
-                    <a:lstStyle/>
-                    <a:p>
-                      <a:pPr lvl="0" marL="0" indent="0" algn="l">
-                        <a:buNone/>
-                      </a:pPr>
-                      <a:r>
-                        <a:rPr/>
-                        <a:t>Ease</a:t>
-                      </a:r>
-                      <a:r>
-                        <a:rPr/>
-                        <a:t> </a:t>
-                      </a:r>
-                      <a:r>
-                        <a:rPr/>
-                        <a:t>of</a:t>
-                      </a:r>
-                      <a:r>
-                        <a:rPr/>
-                        <a:t> </a:t>
-                      </a:r>
-                      <a:r>
-                        <a:rPr/>
-                        <a:t>Use</a:t>
-                      </a:r>
-                    </a:p>
-                  </a:txBody>
-                  <a:tcPr/>
-                </a:tc>
-                <a:tc>
-                  <a:txBody>
-                    <a:bodyPr/>
-                    <a:lstStyle/>
-                    <a:p>
-                      <a:pPr lvl="0" marL="0" indent="0" algn="l">
-                        <a:buNone/>
-                      </a:pPr>
-                      <a:r>
-                        <a:rPr/>
-                        <a:t>Analysis</a:t>
-                      </a:r>
-                      <a:r>
-                        <a:rPr/>
-                        <a:t> </a:t>
-                      </a:r>
-                      <a:r>
-                        <a:rPr/>
-                        <a:t>Capabilities</a:t>
-                      </a:r>
-                    </a:p>
-                  </a:txBody>
-                  <a:tcPr/>
-                </a:tc>
-                <a:tc>
-                  <a:txBody>
-                    <a:bodyPr/>
-                    <a:lstStyle/>
-                    <a:p>
-                      <a:pPr lvl="0" marL="0" indent="0" algn="l">
-                        <a:buNone/>
-                      </a:pPr>
-                      <a:r>
-                        <a:rPr/>
-                        <a:t>Suitability</a:t>
-                      </a:r>
-                      <a:r>
-                        <a:rPr/>
-                        <a:t> </a:t>
-                      </a:r>
-                      <a:r>
-                        <a:rPr/>
-                        <a:t>for</a:t>
-                      </a:r>
-                      <a:r>
-                        <a:rPr/>
-                        <a:t> </a:t>
-                      </a:r>
-                      <a:r>
-                        <a:rPr/>
-                        <a:t>Large</a:t>
-                      </a:r>
-                      <a:r>
-                        <a:rPr/>
-                        <a:t> </a:t>
-                      </a:r>
-                      <a:r>
-                        <a:rPr/>
-                        <a:t>Data</a:t>
-                      </a:r>
-                    </a:p>
-                  </a:txBody>
-                  <a:tcPr/>
-                </a:tc>
-              </a:tr>
-              <a:tr h="0">
-                <a:tc>
-                  <a:txBody>
-                    <a:bodyPr/>
-                    <a:lstStyle/>
-                    <a:p>
-                      <a:pPr lvl="0" marL="0" indent="0" algn="l">
-                        <a:buNone/>
-                      </a:pPr>
-                      <a:r>
-                        <a:rPr/>
-                        <a:t>Excel</a:t>
-                      </a:r>
-                    </a:p>
-                  </a:txBody>
-                </a:tc>
-                <a:tc>
-                  <a:txBody>
-                    <a:bodyPr/>
-                    <a:lstStyle/>
-                    <a:p>
-                      <a:pPr lvl="0" marL="0" indent="0" algn="l">
-                        <a:buNone/>
-                      </a:pPr>
-                      <a:r>
-                        <a:rPr/>
-                        <a:t>Comes</a:t>
-                      </a:r>
-                      <a:r>
-                        <a:rPr/>
-                        <a:t> </a:t>
-                      </a:r>
-                      <a:r>
-                        <a:rPr/>
-                        <a:t>installed</a:t>
-                      </a:r>
-                      <a:r>
-                        <a:rPr/>
-                        <a:t> </a:t>
-                      </a:r>
-                      <a:r>
-                        <a:rPr/>
-                        <a:t>on</a:t>
-                      </a:r>
-                      <a:r>
-                        <a:rPr/>
-                        <a:t> </a:t>
-                      </a:r>
-                      <a:r>
-                        <a:rPr/>
-                        <a:t>many</a:t>
-                      </a:r>
-                      <a:r>
-                        <a:rPr/>
-                        <a:t> </a:t>
-                      </a:r>
-                      <a:r>
-                        <a:rPr/>
-                        <a:t>computers</a:t>
-                      </a:r>
-                    </a:p>
-                  </a:txBody>
-                </a:tc>
-                <a:tc>
-                  <a:txBody>
-                    <a:bodyPr/>
-                    <a:lstStyle/>
-                    <a:p>
-                      <a:pPr lvl="0" marL="0" indent="0" algn="l">
-                        <a:buNone/>
-                      </a:pPr>
-                      <a:r>
-                        <a:rPr/>
-                        <a:t>Easy</a:t>
-                      </a:r>
-                    </a:p>
-                  </a:txBody>
-                </a:tc>
-                <a:tc>
-                  <a:txBody>
-                    <a:bodyPr/>
-                    <a:lstStyle/>
-                    <a:p>
-                      <a:pPr lvl="0" marL="0" indent="0" algn="l">
-                        <a:buNone/>
-                      </a:pPr>
-                      <a:r>
-                        <a:rPr/>
-                        <a:t>Limited</a:t>
-                      </a:r>
-                    </a:p>
-                  </a:txBody>
-                </a:tc>
-                <a:tc>
-                  <a:txBody>
-                    <a:bodyPr/>
-                    <a:lstStyle/>
-                    <a:p>
-                      <a:pPr lvl="0" marL="0" indent="0" algn="l">
-                        <a:buNone/>
-                      </a:pPr>
-                      <a:r>
-                        <a:rPr/>
-                        <a:t>Difficult</a:t>
-                      </a:r>
-                      <a:r>
-                        <a:rPr/>
-                        <a:t> </a:t>
-                      </a:r>
-                      <a:r>
-                        <a:rPr/>
-                        <a:t>when</a:t>
-                      </a:r>
-                      <a:r>
-                        <a:rPr/>
-                        <a:t> </a:t>
-                      </a:r>
-                      <a:r>
-                        <a:rPr/>
-                        <a:t>N</a:t>
-                      </a:r>
-                      <a:r>
-                        <a:rPr/>
-                        <a:t> </a:t>
-                      </a:r>
-                      <a:r>
-                        <a:rPr/>
-                        <a:t>&gt;</a:t>
-                      </a:r>
-                      <a:r>
-                        <a:rPr/>
-                        <a:t> </a:t>
-                      </a:r>
-                      <a:r>
-                        <a:rPr/>
-                        <a:t>100</a:t>
-                      </a:r>
-                    </a:p>
-                  </a:txBody>
-                </a:tc>
-              </a:tr>
-              <a:tr h="0">
-                <a:tc>
-                  <a:txBody>
-                    <a:bodyPr/>
-                    <a:lstStyle/>
-                    <a:p>
-                      <a:pPr lvl="0" marL="0" indent="0" algn="l">
-                        <a:buNone/>
-                      </a:pPr>
-                      <a:r>
-                        <a:rPr/>
-                        <a:t>Google</a:t>
-                      </a:r>
-                      <a:r>
-                        <a:rPr/>
-                        <a:t> </a:t>
-                      </a:r>
-                      <a:r>
-                        <a:rPr/>
-                        <a:t>Sheets</a:t>
-                      </a:r>
-                    </a:p>
-                  </a:txBody>
-                </a:tc>
-                <a:tc>
-                  <a:txBody>
-                    <a:bodyPr/>
-                    <a:lstStyle/>
-                    <a:p>
-                      <a:pPr lvl="0" marL="0" indent="0" algn="l">
-                        <a:buNone/>
-                      </a:pPr>
-                      <a:r>
-                        <a:rPr/>
-                        <a:t>Free</a:t>
-                      </a:r>
-                      <a:r>
-                        <a:rPr/>
-                        <a:t> </a:t>
-                      </a:r>
-                      <a:r>
-                        <a:rPr/>
-                        <a:t>with</a:t>
-                      </a:r>
-                      <a:r>
-                        <a:rPr/>
-                        <a:t> </a:t>
-                      </a:r>
-                      <a:r>
-                        <a:rPr/>
-                        <a:t>a</a:t>
-                      </a:r>
-                      <a:r>
-                        <a:rPr/>
-                        <a:t> </a:t>
-                      </a:r>
-                      <a:r>
-                        <a:rPr/>
-                        <a:t>Google</a:t>
-                      </a:r>
-                      <a:r>
-                        <a:rPr/>
-                        <a:t> </a:t>
-                      </a:r>
-                      <a:r>
-                        <a:rPr/>
-                        <a:t>account</a:t>
-                      </a:r>
-                    </a:p>
-                  </a:txBody>
-                </a:tc>
-                <a:tc>
-                  <a:txBody>
-                    <a:bodyPr/>
-                    <a:lstStyle/>
-                    <a:p>
-                      <a:pPr lvl="0" marL="0" indent="0" algn="l">
-                        <a:buNone/>
-                      </a:pPr>
-                      <a:r>
-                        <a:rPr/>
-                        <a:t>Easy</a:t>
-                      </a:r>
-                    </a:p>
-                  </a:txBody>
-                </a:tc>
-                <a:tc>
-                  <a:txBody>
-                    <a:bodyPr/>
-                    <a:lstStyle/>
-                    <a:p>
-                      <a:pPr lvl="0" marL="0" indent="0" algn="l">
-                        <a:buNone/>
-                      </a:pPr>
-                      <a:r>
-                        <a:rPr/>
-                        <a:t>Limited</a:t>
-                      </a:r>
-                    </a:p>
-                  </a:txBody>
-                </a:tc>
-                <a:tc>
-                  <a:txBody>
-                    <a:bodyPr/>
-                    <a:lstStyle/>
-                    <a:p>
-                      <a:pPr lvl="0" marL="0" indent="0" algn="l">
-                        <a:buNone/>
-                      </a:pPr>
-                      <a:r>
-                        <a:rPr/>
-                        <a:t>Difficult</a:t>
-                      </a:r>
-                      <a:r>
-                        <a:rPr/>
-                        <a:t> </a:t>
-                      </a:r>
-                      <a:r>
-                        <a:rPr/>
-                        <a:t>when</a:t>
-                      </a:r>
-                      <a:r>
-                        <a:rPr/>
-                        <a:t> </a:t>
-                      </a:r>
-                      <a:r>
-                        <a:rPr/>
-                        <a:t>N</a:t>
-                      </a:r>
-                      <a:r>
-                        <a:rPr/>
-                        <a:t> </a:t>
-                      </a:r>
-                      <a:r>
-                        <a:rPr/>
-                        <a:t>&gt;</a:t>
-                      </a:r>
-                      <a:r>
-                        <a:rPr/>
-                        <a:t> </a:t>
-                      </a:r>
-                      <a:r>
-                        <a:rPr/>
-                        <a:t>100</a:t>
-                      </a:r>
-                    </a:p>
-                  </a:txBody>
-                </a:tc>
-              </a:tr>
-              <a:tr h="0">
-                <a:tc>
-                  <a:txBody>
-                    <a:bodyPr/>
-                    <a:lstStyle/>
-                    <a:p>
-                      <a:pPr lvl="0" marL="0" indent="0" algn="l">
-                        <a:buNone/>
-                      </a:pPr>
-                      <a:r>
-                        <a:rPr/>
-                        <a:t>R</a:t>
-                      </a:r>
-                    </a:p>
-                  </a:txBody>
-                </a:tc>
-                <a:tc>
-                  <a:txBody>
-                    <a:bodyPr/>
-                    <a:lstStyle/>
-                    <a:p>
-                      <a:pPr lvl="0" marL="0" indent="0" algn="l">
-                        <a:buNone/>
-                      </a:pPr>
-                      <a:r>
-                        <a:rPr/>
-                        <a:t>Free</a:t>
-                      </a:r>
-                    </a:p>
-                  </a:txBody>
-                </a:tc>
-                <a:tc>
-                  <a:txBody>
-                    <a:bodyPr/>
-                    <a:lstStyle/>
-                    <a:p>
-                      <a:pPr lvl="0" marL="0" indent="0" algn="l">
-                        <a:buNone/>
-                      </a:pPr>
-                      <a:r>
-                        <a:rPr/>
-                        <a:t>Challenging</a:t>
-                      </a:r>
-                    </a:p>
-                  </a:txBody>
-                </a:tc>
-                <a:tc>
-                  <a:txBody>
-                    <a:bodyPr/>
-                    <a:lstStyle/>
-                    <a:p>
-                      <a:pPr lvl="0" marL="0" indent="0" algn="l">
-                        <a:buNone/>
-                      </a:pPr>
-                      <a:r>
-                        <a:rPr/>
-                        <a:t>Extensive</a:t>
-                      </a:r>
-                    </a:p>
-                  </a:txBody>
-                </a:tc>
-                <a:tc>
-                  <a:txBody>
-                    <a:bodyPr/>
-                    <a:lstStyle/>
-                    <a:p>
-                      <a:pPr lvl="0" marL="0" indent="0" algn="l">
-                        <a:buNone/>
-                      </a:pPr>
-                      <a:r>
-                        <a:rPr/>
-                        <a:t>Excellent</a:t>
-                      </a:r>
-                      <a:r>
-                        <a:rPr/>
-                        <a:t> </a:t>
-                      </a:r>
-                      <a:r>
-                        <a:rPr/>
-                        <a:t>with</a:t>
-                      </a:r>
-                      <a:r>
-                        <a:rPr/>
-                        <a:t> </a:t>
-                      </a:r>
-                      <a:r>
-                        <a:rPr/>
-                        <a:t>large</a:t>
-                      </a:r>
-                      <a:r>
-                        <a:rPr/>
-                        <a:t> </a:t>
-                      </a:r>
-                      <a:r>
-                        <a:rPr/>
-                        <a:t>datasets</a:t>
-                      </a:r>
-                    </a:p>
-                  </a:txBody>
-                </a:tc>
-              </a:tr>
-              <a:tr h="0">
-                <a:tc>
-                  <a:txBody>
-                    <a:bodyPr/>
-                    <a:lstStyle/>
-                    <a:p>
-                      <a:pPr lvl="0" marL="0" indent="0" algn="l">
-                        <a:buNone/>
-                      </a:pPr>
-                      <a:r>
-                        <a:rPr/>
-                        <a:t>Stata</a:t>
-                      </a:r>
-                    </a:p>
-                  </a:txBody>
-                </a:tc>
-                <a:tc>
-                  <a:txBody>
-                    <a:bodyPr/>
-                    <a:lstStyle/>
-                    <a:p>
-                      <a:pPr lvl="0" marL="0" indent="0" algn="l">
-                        <a:buNone/>
-                      </a:pPr>
-                      <a:r>
-                        <a:rPr/>
-                        <a:t>$$</a:t>
-                      </a:r>
-                    </a:p>
-                  </a:txBody>
-                </a:tc>
-                <a:tc>
-                  <a:txBody>
-                    <a:bodyPr/>
-                    <a:lstStyle/>
-                    <a:p>
-                      <a:pPr lvl="0" marL="0" indent="0" algn="l">
-                        <a:buNone/>
-                      </a:pPr>
-                      <a:r>
-                        <a:rPr/>
-                        <a:t>Learning</a:t>
-                      </a:r>
-                      <a:r>
-                        <a:rPr/>
-                        <a:t> </a:t>
-                      </a:r>
-                      <a:r>
-                        <a:rPr/>
-                        <a:t>Curve</a:t>
-                      </a:r>
-                      <a:r>
-                        <a:rPr/>
-                        <a:t> </a:t>
-                      </a:r>
-                      <a:r>
-                        <a:rPr/>
-                        <a:t>(Intuitive)</a:t>
-                      </a:r>
-                    </a:p>
-                  </a:txBody>
-                </a:tc>
-                <a:tc>
-                  <a:txBody>
-                    <a:bodyPr/>
-                    <a:lstStyle/>
-                    <a:p>
-                      <a:pPr lvl="0" marL="0" indent="0" algn="l">
-                        <a:buNone/>
-                      </a:pPr>
-                      <a:r>
-                        <a:rPr/>
-                        <a:t>Extensive</a:t>
-                      </a:r>
-                    </a:p>
-                  </a:txBody>
-                </a:tc>
-                <a:tc>
-                  <a:txBody>
-                    <a:bodyPr/>
-                    <a:lstStyle/>
-                    <a:p>
-                      <a:pPr lvl="0" marL="0" indent="0" algn="l">
-                        <a:buNone/>
-                      </a:pPr>
-                      <a:r>
-                        <a:rPr/>
-                        <a:t>Excellent</a:t>
-                      </a:r>
-                      <a:r>
-                        <a:rPr/>
-                        <a:t> </a:t>
-                      </a:r>
-                      <a:r>
-                        <a:rPr/>
-                        <a:t>with</a:t>
-                      </a:r>
-                      <a:r>
-                        <a:rPr/>
-                        <a:t> </a:t>
-                      </a:r>
-                      <a:r>
-                        <a:rPr/>
-                        <a:t>large</a:t>
-                      </a:r>
-                      <a:r>
-                        <a:rPr/>
-                        <a:t> </a:t>
-                      </a:r>
-                      <a:r>
-                        <a:rPr/>
-                        <a:t>datasets</a:t>
-                      </a:r>
-                    </a:p>
-                  </a:txBody>
-                </a:tc>
-              </a:tr>
-            </a:tbl>
-          </a:graphicData>
-        </a:graphic>
-      </p:graphicFrame>
     </p:spTree>
   </p:cSld>
 </p:sld>
@@ -4074,39 +5824,104 @@
           <a:chExt cx="0" cy="0"/>
         </a:xfrm>
       </p:grpSpPr>
-      <p:sp>
-        <p:nvSpPr>
-          <p:cNvPr id="2" name="Title 1"/>
-          <p:cNvSpPr>
-            <a:spLocks noGrp="1"/>
-          </p:cNvSpPr>
-          <p:nvPr>
-            <p:ph type="title"/>
-          </p:nvPr>
-        </p:nvSpPr>
-        <p:spPr/>
-        <p:txBody>
-          <a:bodyPr/>
-          <a:lstStyle/>
-          <a:p>
-            <a:pPr lvl="0" marL="0" indent="0">
-              <a:buNone/>
-            </a:pPr>
-            <a:r>
-              <a:rPr/>
-              <a:t>Cleaning</a:t>
-            </a:r>
-            <a:r>
-              <a:rPr/>
-              <a:t> </a:t>
-            </a:r>
-            <a:r>
-              <a:rPr/>
-              <a:t>Data</a:t>
-            </a:r>
-          </a:p>
-        </p:txBody>
-      </p:sp>
+      <mc:AlternateContent xmlns:mc="http://schemas.openxmlformats.org/markup-compatibility/2006">
+        <mc:Choice xmlns:a14="http://schemas.microsoft.com/office/drawing/2010/main" Requires="a14">
+          <p:sp>
+            <p:nvSpPr>
+              <p:cNvPr id="3" name="Content Placeholder 2"/>
+              <p:cNvSpPr>
+                <a:spLocks noGrp="1"/>
+              </p:cNvSpPr>
+              <p:nvPr>
+                <p:ph idx="1"/>
+              </p:nvPr>
+            </p:nvSpPr>
+            <p:spPr/>
+            <p:txBody>
+              <a:bodyPr/>
+              <a:lstStyle/>
+              <a:p>
+                <a:pPr lvl="0" marL="0" indent="0">
+                  <a:buNone/>
+                </a:pPr>
+                <a:r>
+                  <a:rPr/>
+                  <a:t>A great deal of data analysis and visualization involves the same core set of steps.</a:t>
+                </a:r>
+              </a:p>
+              <a:p>
+                <a:pPr lvl="0" marL="0" indent="0">
+                  <a:buNone/>
+                </a:pPr>
+                <a14:m>
+                  <m:oMathPara xmlns:m="http://schemas.openxmlformats.org/officeDocument/2006/math">
+                    <m:oMathParaPr>
+                      <m:jc m:val="center"/>
+                    </m:oMathParaPr>
+                    <m:oMath>
+                      <m:r>
+                        <m:rPr>
+                          <m:nor/>
+                          <m:sty m:val="p"/>
+                        </m:rPr>
+                        <m:t>have a question</m:t>
+                      </m:r>
+                      <m:r>
+                        <m:rPr>
+                          <m:sty m:val="p"/>
+                        </m:rPr>
+                        <m:t>→</m:t>
+                      </m:r>
+                      <m:r>
+                        <m:rPr>
+                          <m:nor/>
+                          <m:sty m:val="p"/>
+                        </m:rPr>
+                        <m:t>get data</m:t>
+                      </m:r>
+                      <m:r>
+                        <m:rPr>
+                          <m:sty m:val="p"/>
+                        </m:rPr>
+                        <m:t>→</m:t>
+                      </m:r>
+                      <m:r>
+                        <m:rPr>
+                          <m:nor/>
+                          <m:sty m:val="p"/>
+                        </m:rPr>
+                        <m:t>process and clean data</m:t>
+                      </m:r>
+                      <m:r>
+                        <m:rPr>
+                          <m:sty m:val="p"/>
+                        </m:rPr>
+                        <m:t>→</m:t>
+                      </m:r>
+                      <m:r>
+                        <m:rPr>
+                          <m:nor/>
+                          <m:sty m:val="p"/>
+                        </m:rPr>
+                        <m:t>analyze data</m:t>
+                      </m:r>
+                    </m:oMath>
+                  </m:oMathPara>
+                </a14:m>
+              </a:p>
+              <a:p>
+                <a:pPr lvl="0" marL="0" indent="0">
+                  <a:buNone/>
+                </a:pPr>
+                <a:r>
+                  <a:rPr/>
+                  <a:t>Below we describe some simple data cleaning, and simple analysis with 4 tools: Excel, Google Sheets, R, and Stata.</a:t>
+                </a:r>
+              </a:p>
+            </p:txBody>
+          </p:sp>
+        </mc:Choice>
+      </mc:AlternateContent>
     </p:spTree>
   </p:cSld>
 </p:sld>
@@ -4139,6 +5954,1030 @@
             <p:ph type="title"/>
           </p:nvPr>
         </p:nvSpPr>
+        <p:spPr>
+          <a:xfrm>
+            <a:off x="722313" y="4406900"/>
+            <a:ext cx="7772400" cy="1362075"/>
+          </a:xfrm>
+        </p:spPr>
+        <p:txBody>
+          <a:bodyPr/>
+          <a:lstStyle/>
+          <a:p>
+            <a:pPr lvl="0" marL="0" indent="0">
+              <a:buNone/>
+            </a:pPr>
+            <a:r>
+              <a:rPr/>
+              <a:t>Some</a:t>
+            </a:r>
+            <a:r>
+              <a:rPr/>
+              <a:t> </a:t>
+            </a:r>
+            <a:r>
+              <a:rPr/>
+              <a:t>Tools</a:t>
+            </a:r>
+            <a:r>
+              <a:rPr/>
+              <a:t> </a:t>
+            </a:r>
+            <a:r>
+              <a:rPr/>
+              <a:t>for</a:t>
+            </a:r>
+            <a:r>
+              <a:rPr/>
+              <a:t> </a:t>
+            </a:r>
+            <a:r>
+              <a:rPr/>
+              <a:t>Analysis</a:t>
+            </a:r>
+          </a:p>
+        </p:txBody>
+      </p:sp>
+    </p:spTree>
+  </p:cSld>
+</p:sld>
+</file>
+
+<file path=ppt/slides/slide6.xml><?xml version="1.0" encoding="utf-8"?>
+<p:sld xmlns:a="http://schemas.openxmlformats.org/drawingml/2006/main" xmlns:r="http://schemas.openxmlformats.org/officeDocument/2006/relationships" xmlns:p="http://schemas.openxmlformats.org/presentationml/2006/main">
+  <p:cSld>
+    <p:spTree>
+      <p:nvGrpSpPr>
+        <p:cNvPr id="1" name=""/>
+        <p:cNvGrpSpPr/>
+        <p:nvPr/>
+      </p:nvGrpSpPr>
+      <p:grpSpPr>
+        <a:xfrm>
+          <a:off x="0" y="0"/>
+          <a:ext cx="0" cy="0"/>
+          <a:chOff x="0" y="0"/>
+          <a:chExt cx="0" cy="0"/>
+        </a:xfrm>
+      </p:grpSpPr>
+      <p:graphicFrame>
+        <p:nvGraphicFramePr>
+          <p:cNvPr id="6" name="Content Placeholder 5"/>
+          <p:cNvGraphicFramePr>
+            <a:graphicFrameLocks noGrp="1"/>
+          </p:cNvGraphicFramePr>
+          <p:nvPr>
+            <p:ph idx="1"/>
+          </p:nvPr>
+        </p:nvGraphicFramePr>
+        <p:xfrm>
+          <a:off x="457200" y="1600200"/>
+          <a:ext cx="8229600" cy="4521200"/>
+        </p:xfrm>
+        <a:graphic>
+          <a:graphicData uri="http://schemas.openxmlformats.org/drawingml/2006/table">
+            <a:tbl>
+              <a:tblPr firstRow="1" bandRow="1">
+                <a:tableStyleId>{5C22544A-7EE6-4342-B048-85BDC9FD1C3A}</a:tableStyleId>
+              </a:tblPr>
+              <a:tblGrid>
+                <a:gridCol w="1371600"/>
+                <a:gridCol w="1371600"/>
+                <a:gridCol w="1371600"/>
+                <a:gridCol w="1371600"/>
+                <a:gridCol w="1371600"/>
+                <a:gridCol w="1371600"/>
+              </a:tblGrid>
+              <a:tr h="0">
+                <a:tc>
+                  <a:txBody>
+                    <a:bodyPr/>
+                    <a:lstStyle/>
+                    <a:p>
+                      <a:pPr lvl="0" marL="0" indent="0" algn="l">
+                        <a:buNone/>
+                      </a:pPr>
+                      <a:r>
+                        <a:rPr/>
+                        <a:t>Tool</a:t>
+                      </a:r>
+                    </a:p>
+                  </a:txBody>
+                  <a:tcPr/>
+                </a:tc>
+                <a:tc>
+                  <a:txBody>
+                    <a:bodyPr/>
+                    <a:lstStyle/>
+                    <a:p>
+                      <a:pPr lvl="0" marL="0" indent="0" algn="l">
+                        <a:buNone/>
+                      </a:pPr>
+                      <a:r>
+                        <a:rPr/>
+                        <a:t>Cost</a:t>
+                      </a:r>
+                    </a:p>
+                  </a:txBody>
+                  <a:tcPr/>
+                </a:tc>
+                <a:tc>
+                  <a:txBody>
+                    <a:bodyPr/>
+                    <a:lstStyle/>
+                    <a:p>
+                      <a:pPr lvl="0" marL="0" indent="0" algn="l">
+                        <a:buNone/>
+                      </a:pPr>
+                      <a:r>
+                        <a:rPr/>
+                        <a:t>Ease</a:t>
+                      </a:r>
+                      <a:r>
+                        <a:rPr/>
+                        <a:t> </a:t>
+                      </a:r>
+                      <a:r>
+                        <a:rPr/>
+                        <a:t>of</a:t>
+                      </a:r>
+                      <a:r>
+                        <a:rPr/>
+                        <a:t> </a:t>
+                      </a:r>
+                      <a:r>
+                        <a:rPr/>
+                        <a:t>Use</a:t>
+                      </a:r>
+                    </a:p>
+                  </a:txBody>
+                  <a:tcPr/>
+                </a:tc>
+                <a:tc>
+                  <a:txBody>
+                    <a:bodyPr/>
+                    <a:lstStyle/>
+                    <a:p>
+                      <a:pPr lvl="0" marL="0" indent="0" algn="l">
+                        <a:buNone/>
+                      </a:pPr>
+                      <a:r>
+                        <a:rPr/>
+                        <a:t>Analysis</a:t>
+                      </a:r>
+                      <a:r>
+                        <a:rPr/>
+                        <a:t> </a:t>
+                      </a:r>
+                      <a:r>
+                        <a:rPr/>
+                        <a:t>Capabilities</a:t>
+                      </a:r>
+                    </a:p>
+                  </a:txBody>
+                  <a:tcPr/>
+                </a:tc>
+                <a:tc>
+                  <a:txBody>
+                    <a:bodyPr/>
+                    <a:lstStyle/>
+                    <a:p>
+                      <a:pPr lvl="0" marL="0" indent="0" algn="l">
+                        <a:buNone/>
+                      </a:pPr>
+                      <a:r>
+                        <a:rPr/>
+                        <a:t>Suitability</a:t>
+                      </a:r>
+                      <a:r>
+                        <a:rPr/>
+                        <a:t> </a:t>
+                      </a:r>
+                      <a:r>
+                        <a:rPr/>
+                        <a:t>for</a:t>
+                      </a:r>
+                      <a:r>
+                        <a:rPr/>
+                        <a:t> </a:t>
+                      </a:r>
+                      <a:r>
+                        <a:rPr/>
+                        <a:t>Large</a:t>
+                      </a:r>
+                      <a:r>
+                        <a:rPr/>
+                        <a:t> </a:t>
+                      </a:r>
+                      <a:r>
+                        <a:rPr/>
+                        <a:t>Data</a:t>
+                      </a:r>
+                    </a:p>
+                  </a:txBody>
+                  <a:tcPr/>
+                </a:tc>
+                <a:tc>
+                  <a:txBody>
+                    <a:bodyPr/>
+                    <a:lstStyle/>
+                    <a:p>
+                      <a:pPr lvl="0" marL="0" indent="0" algn="l">
+                        <a:buNone/>
+                      </a:pPr>
+                      <a:r>
+                        <a:rPr/>
+                        <a:t>Keep</a:t>
+                      </a:r>
+                      <a:r>
+                        <a:rPr/>
+                        <a:t> </a:t>
+                      </a:r>
+                      <a:r>
+                        <a:rPr/>
+                        <a:t>Track</a:t>
+                      </a:r>
+                      <a:r>
+                        <a:rPr/>
+                        <a:t> </a:t>
+                      </a:r>
+                      <a:r>
+                        <a:rPr/>
+                        <a:t>of</a:t>
+                      </a:r>
+                      <a:r>
+                        <a:rPr/>
+                        <a:t> </a:t>
+                      </a:r>
+                      <a:r>
+                        <a:rPr/>
+                        <a:t>Complicated</a:t>
+                      </a:r>
+                      <a:r>
+                        <a:rPr/>
+                        <a:t> </a:t>
+                      </a:r>
+                      <a:r>
+                        <a:rPr/>
+                        <a:t>Workflows</a:t>
+                      </a:r>
+                    </a:p>
+                  </a:txBody>
+                  <a:tcPr/>
+                </a:tc>
+              </a:tr>
+              <a:tr h="0">
+                <a:tc>
+                  <a:txBody>
+                    <a:bodyPr/>
+                    <a:lstStyle/>
+                    <a:p>
+                      <a:pPr lvl="0" marL="0" indent="0" algn="l">
+                        <a:buNone/>
+                      </a:pPr>
+                      <a:r>
+                        <a:rPr/>
+                        <a:t>Excel</a:t>
+                      </a:r>
+                    </a:p>
+                  </a:txBody>
+                </a:tc>
+                <a:tc>
+                  <a:txBody>
+                    <a:bodyPr/>
+                    <a:lstStyle/>
+                    <a:p>
+                      <a:pPr lvl="0" marL="0" indent="0" algn="l">
+                        <a:buNone/>
+                      </a:pPr>
+                      <a:r>
+                        <a:rPr/>
+                        <a:t>Comes</a:t>
+                      </a:r>
+                      <a:r>
+                        <a:rPr/>
+                        <a:t> </a:t>
+                      </a:r>
+                      <a:r>
+                        <a:rPr/>
+                        <a:t>installed</a:t>
+                      </a:r>
+                      <a:r>
+                        <a:rPr/>
+                        <a:t> </a:t>
+                      </a:r>
+                      <a:r>
+                        <a:rPr/>
+                        <a:t>on</a:t>
+                      </a:r>
+                      <a:r>
+                        <a:rPr/>
+                        <a:t> </a:t>
+                      </a:r>
+                      <a:r>
+                        <a:rPr/>
+                        <a:t>many</a:t>
+                      </a:r>
+                      <a:r>
+                        <a:rPr/>
+                        <a:t> </a:t>
+                      </a:r>
+                      <a:r>
+                        <a:rPr/>
+                        <a:t>computers</a:t>
+                      </a:r>
+                    </a:p>
+                  </a:txBody>
+                </a:tc>
+                <a:tc>
+                  <a:txBody>
+                    <a:bodyPr/>
+                    <a:lstStyle/>
+                    <a:p>
+                      <a:pPr lvl="0" marL="0" indent="0" algn="l">
+                        <a:buNone/>
+                      </a:pPr>
+                      <a:r>
+                        <a:rPr/>
+                        <a:t>Easy</a:t>
+                      </a:r>
+                    </a:p>
+                  </a:txBody>
+                </a:tc>
+                <a:tc>
+                  <a:txBody>
+                    <a:bodyPr/>
+                    <a:lstStyle/>
+                    <a:p>
+                      <a:pPr lvl="0" marL="0" indent="0" algn="l">
+                        <a:buNone/>
+                      </a:pPr>
+                      <a:r>
+                        <a:rPr/>
+                        <a:t>Limited</a:t>
+                      </a:r>
+                    </a:p>
+                  </a:txBody>
+                </a:tc>
+                <a:tc>
+                  <a:txBody>
+                    <a:bodyPr/>
+                    <a:lstStyle/>
+                    <a:p>
+                      <a:pPr lvl="0" marL="0" indent="0" algn="l">
+                        <a:buNone/>
+                      </a:pPr>
+                      <a:r>
+                        <a:rPr/>
+                        <a:t>Difficult</a:t>
+                      </a:r>
+                      <a:r>
+                        <a:rPr/>
+                        <a:t> </a:t>
+                      </a:r>
+                      <a:r>
+                        <a:rPr/>
+                        <a:t>when</a:t>
+                      </a:r>
+                      <a:r>
+                        <a:rPr/>
+                        <a:t> </a:t>
+                      </a:r>
+                      <a:r>
+                        <a:rPr/>
+                        <a:t>N</a:t>
+                      </a:r>
+                      <a:r>
+                        <a:rPr/>
+                        <a:t> </a:t>
+                      </a:r>
+                      <a:r>
+                        <a:rPr/>
+                        <a:t>&gt;</a:t>
+                      </a:r>
+                      <a:r>
+                        <a:rPr/>
+                        <a:t> </a:t>
+                      </a:r>
+                      <a:r>
+                        <a:rPr/>
+                        <a:t>100</a:t>
+                      </a:r>
+                    </a:p>
+                  </a:txBody>
+                </a:tc>
+                <a:tc>
+                  <a:txBody>
+                    <a:bodyPr/>
+                    <a:lstStyle/>
+                    <a:p>
+                      <a:pPr lvl="0" marL="0" indent="0" algn="l">
+                        <a:buNone/>
+                      </a:pPr>
+                      <a:r>
+                        <a:rPr/>
+                        <a:t>Difficult</a:t>
+                      </a:r>
+                      <a:r>
+                        <a:rPr/>
+                        <a:t> </a:t>
+                      </a:r>
+                      <a:r>
+                        <a:rPr/>
+                        <a:t>to</a:t>
+                      </a:r>
+                      <a:r>
+                        <a:rPr/>
+                        <a:t> </a:t>
+                      </a:r>
+                      <a:r>
+                        <a:rPr/>
+                        <a:t>Impossible</a:t>
+                      </a:r>
+                    </a:p>
+                  </a:txBody>
+                </a:tc>
+              </a:tr>
+              <a:tr h="0">
+                <a:tc>
+                  <a:txBody>
+                    <a:bodyPr/>
+                    <a:lstStyle/>
+                    <a:p>
+                      <a:pPr lvl="0" marL="0" indent="0" algn="l">
+                        <a:buNone/>
+                      </a:pPr>
+                      <a:r>
+                        <a:rPr/>
+                        <a:t>Google</a:t>
+                      </a:r>
+                      <a:r>
+                        <a:rPr/>
+                        <a:t> </a:t>
+                      </a:r>
+                      <a:r>
+                        <a:rPr/>
+                        <a:t>Sheets</a:t>
+                      </a:r>
+                    </a:p>
+                  </a:txBody>
+                </a:tc>
+                <a:tc>
+                  <a:txBody>
+                    <a:bodyPr/>
+                    <a:lstStyle/>
+                    <a:p>
+                      <a:pPr lvl="0" marL="0" indent="0" algn="l">
+                        <a:buNone/>
+                      </a:pPr>
+                      <a:r>
+                        <a:rPr/>
+                        <a:t>Free</a:t>
+                      </a:r>
+                      <a:r>
+                        <a:rPr/>
+                        <a:t> </a:t>
+                      </a:r>
+                      <a:r>
+                        <a:rPr/>
+                        <a:t>with</a:t>
+                      </a:r>
+                      <a:r>
+                        <a:rPr/>
+                        <a:t> </a:t>
+                      </a:r>
+                      <a:r>
+                        <a:rPr/>
+                        <a:t>a</a:t>
+                      </a:r>
+                      <a:r>
+                        <a:rPr/>
+                        <a:t> </a:t>
+                      </a:r>
+                      <a:r>
+                        <a:rPr/>
+                        <a:t>Google</a:t>
+                      </a:r>
+                      <a:r>
+                        <a:rPr/>
+                        <a:t> </a:t>
+                      </a:r>
+                      <a:r>
+                        <a:rPr/>
+                        <a:t>account</a:t>
+                      </a:r>
+                    </a:p>
+                  </a:txBody>
+                </a:tc>
+                <a:tc>
+                  <a:txBody>
+                    <a:bodyPr/>
+                    <a:lstStyle/>
+                    <a:p>
+                      <a:pPr lvl="0" marL="0" indent="0" algn="l">
+                        <a:buNone/>
+                      </a:pPr>
+                      <a:r>
+                        <a:rPr/>
+                        <a:t>Easy</a:t>
+                      </a:r>
+                    </a:p>
+                  </a:txBody>
+                </a:tc>
+                <a:tc>
+                  <a:txBody>
+                    <a:bodyPr/>
+                    <a:lstStyle/>
+                    <a:p>
+                      <a:pPr lvl="0" marL="0" indent="0" algn="l">
+                        <a:buNone/>
+                      </a:pPr>
+                      <a:r>
+                        <a:rPr/>
+                        <a:t>Limited</a:t>
+                      </a:r>
+                    </a:p>
+                  </a:txBody>
+                </a:tc>
+                <a:tc>
+                  <a:txBody>
+                    <a:bodyPr/>
+                    <a:lstStyle/>
+                    <a:p>
+                      <a:pPr lvl="0" marL="0" indent="0" algn="l">
+                        <a:buNone/>
+                      </a:pPr>
+                      <a:r>
+                        <a:rPr/>
+                        <a:t>Difficult</a:t>
+                      </a:r>
+                      <a:r>
+                        <a:rPr/>
+                        <a:t> </a:t>
+                      </a:r>
+                      <a:r>
+                        <a:rPr/>
+                        <a:t>when</a:t>
+                      </a:r>
+                      <a:r>
+                        <a:rPr/>
+                        <a:t> </a:t>
+                      </a:r>
+                      <a:r>
+                        <a:rPr/>
+                        <a:t>N</a:t>
+                      </a:r>
+                      <a:r>
+                        <a:rPr/>
+                        <a:t> </a:t>
+                      </a:r>
+                      <a:r>
+                        <a:rPr/>
+                        <a:t>&gt;</a:t>
+                      </a:r>
+                      <a:r>
+                        <a:rPr/>
+                        <a:t> </a:t>
+                      </a:r>
+                      <a:r>
+                        <a:rPr/>
+                        <a:t>100</a:t>
+                      </a:r>
+                    </a:p>
+                  </a:txBody>
+                </a:tc>
+                <a:tc>
+                  <a:txBody>
+                    <a:bodyPr/>
+                    <a:lstStyle/>
+                    <a:p>
+                      <a:pPr lvl="0" marL="0" indent="0" algn="l">
+                        <a:buNone/>
+                      </a:pPr>
+                      <a:r>
+                        <a:rPr/>
+                        <a:t>Difficult</a:t>
+                      </a:r>
+                      <a:r>
+                        <a:rPr/>
+                        <a:t> </a:t>
+                      </a:r>
+                      <a:r>
+                        <a:rPr/>
+                        <a:t>to</a:t>
+                      </a:r>
+                      <a:r>
+                        <a:rPr/>
+                        <a:t> </a:t>
+                      </a:r>
+                      <a:r>
+                        <a:rPr/>
+                        <a:t>Impossible</a:t>
+                      </a:r>
+                    </a:p>
+                  </a:txBody>
+                </a:tc>
+              </a:tr>
+              <a:tr h="0">
+                <a:tc>
+                  <a:txBody>
+                    <a:bodyPr/>
+                    <a:lstStyle/>
+                    <a:p>
+                      <a:pPr lvl="0" marL="0" indent="0" algn="l">
+                        <a:buNone/>
+                      </a:pPr>
+                      <a:r>
+                        <a:rPr/>
+                        <a:t>R</a:t>
+                      </a:r>
+                    </a:p>
+                  </a:txBody>
+                </a:tc>
+                <a:tc>
+                  <a:txBody>
+                    <a:bodyPr/>
+                    <a:lstStyle/>
+                    <a:p>
+                      <a:pPr lvl="0" marL="0" indent="0" algn="l">
+                        <a:buNone/>
+                      </a:pPr>
+                      <a:r>
+                        <a:rPr/>
+                        <a:t>Free</a:t>
+                      </a:r>
+                    </a:p>
+                  </a:txBody>
+                </a:tc>
+                <a:tc>
+                  <a:txBody>
+                    <a:bodyPr/>
+                    <a:lstStyle/>
+                    <a:p>
+                      <a:pPr lvl="0" marL="0" indent="0" algn="l">
+                        <a:buNone/>
+                      </a:pPr>
+                      <a:r>
+                        <a:rPr/>
+                        <a:t>Challenging</a:t>
+                      </a:r>
+                    </a:p>
+                  </a:txBody>
+                </a:tc>
+                <a:tc>
+                  <a:txBody>
+                    <a:bodyPr/>
+                    <a:lstStyle/>
+                    <a:p>
+                      <a:pPr lvl="0" marL="0" indent="0" algn="l">
+                        <a:buNone/>
+                      </a:pPr>
+                      <a:r>
+                        <a:rPr/>
+                        <a:t>Extensive</a:t>
+                      </a:r>
+                    </a:p>
+                  </a:txBody>
+                </a:tc>
+                <a:tc>
+                  <a:txBody>
+                    <a:bodyPr/>
+                    <a:lstStyle/>
+                    <a:p>
+                      <a:pPr lvl="0" marL="0" indent="0" algn="l">
+                        <a:buNone/>
+                      </a:pPr>
+                      <a:r>
+                        <a:rPr/>
+                        <a:t>Excellent</a:t>
+                      </a:r>
+                      <a:r>
+                        <a:rPr/>
+                        <a:t> </a:t>
+                      </a:r>
+                      <a:r>
+                        <a:rPr/>
+                        <a:t>with</a:t>
+                      </a:r>
+                      <a:r>
+                        <a:rPr/>
+                        <a:t> </a:t>
+                      </a:r>
+                      <a:r>
+                        <a:rPr/>
+                        <a:t>large</a:t>
+                      </a:r>
+                      <a:r>
+                        <a:rPr/>
+                        <a:t> </a:t>
+                      </a:r>
+                      <a:r>
+                        <a:rPr/>
+                        <a:t>datasets</a:t>
+                      </a:r>
+                    </a:p>
+                  </a:txBody>
+                </a:tc>
+                <a:tc>
+                  <a:txBody>
+                    <a:bodyPr/>
+                    <a:lstStyle/>
+                    <a:p>
+                      <a:pPr lvl="0" marL="0" indent="0" algn="l">
+                        <a:buNone/>
+                      </a:pPr>
+                      <a:r>
+                        <a:rPr/>
+                        <a:t>Yes,</a:t>
+                      </a:r>
+                      <a:r>
+                        <a:rPr/>
+                        <a:t> </a:t>
+                      </a:r>
+                      <a:r>
+                        <a:rPr/>
+                        <a:t>with</a:t>
+                      </a:r>
+                      <a:r>
+                        <a:rPr/>
+                        <a:t> </a:t>
+                      </a:r>
+                      <a:r>
+                        <a:rPr/>
+                        <a:t>script</a:t>
+                      </a:r>
+                    </a:p>
+                  </a:txBody>
+                </a:tc>
+              </a:tr>
+              <a:tr h="0">
+                <a:tc>
+                  <a:txBody>
+                    <a:bodyPr/>
+                    <a:lstStyle/>
+                    <a:p>
+                      <a:pPr lvl="0" marL="0" indent="0" algn="l">
+                        <a:buNone/>
+                      </a:pPr>
+                      <a:r>
+                        <a:rPr/>
+                        <a:t>Stata</a:t>
+                      </a:r>
+                    </a:p>
+                  </a:txBody>
+                </a:tc>
+                <a:tc>
+                  <a:txBody>
+                    <a:bodyPr/>
+                    <a:lstStyle/>
+                    <a:p>
+                      <a:pPr lvl="0" marL="0" indent="0" algn="l">
+                        <a:buNone/>
+                      </a:pPr>
+                      <a:r>
+                        <a:rPr/>
+                        <a:t>Some</a:t>
+                      </a:r>
+                      <a:r>
+                        <a:rPr/>
+                        <a:t> </a:t>
+                      </a:r>
+                      <a:r>
+                        <a:rPr/>
+                        <a:t>cost</a:t>
+                      </a:r>
+                    </a:p>
+                  </a:txBody>
+                </a:tc>
+                <a:tc>
+                  <a:txBody>
+                    <a:bodyPr/>
+                    <a:lstStyle/>
+                    <a:p>
+                      <a:pPr lvl="0" marL="0" indent="0" algn="l">
+                        <a:buNone/>
+                      </a:pPr>
+                      <a:r>
+                        <a:rPr/>
+                        <a:t>Learning</a:t>
+                      </a:r>
+                      <a:r>
+                        <a:rPr/>
+                        <a:t> </a:t>
+                      </a:r>
+                      <a:r>
+                        <a:rPr/>
+                        <a:t>Curve</a:t>
+                      </a:r>
+                      <a:r>
+                        <a:rPr/>
+                        <a:t> </a:t>
+                      </a:r>
+                      <a:r>
+                        <a:rPr/>
+                        <a:t>but</a:t>
+                      </a:r>
+                      <a:r>
+                        <a:rPr/>
+                        <a:t> </a:t>
+                      </a:r>
+                      <a:r>
+                        <a:rPr/>
+                        <a:t>Intuitive</a:t>
+                      </a:r>
+                    </a:p>
+                  </a:txBody>
+                </a:tc>
+                <a:tc>
+                  <a:txBody>
+                    <a:bodyPr/>
+                    <a:lstStyle/>
+                    <a:p>
+                      <a:pPr lvl="0" marL="0" indent="0" algn="l">
+                        <a:buNone/>
+                      </a:pPr>
+                      <a:r>
+                        <a:rPr/>
+                        <a:t>Extensive</a:t>
+                      </a:r>
+                    </a:p>
+                  </a:txBody>
+                </a:tc>
+                <a:tc>
+                  <a:txBody>
+                    <a:bodyPr/>
+                    <a:lstStyle/>
+                    <a:p>
+                      <a:pPr lvl="0" marL="0" indent="0" algn="l">
+                        <a:buNone/>
+                      </a:pPr>
+                      <a:r>
+                        <a:rPr/>
+                        <a:t>Excellent</a:t>
+                      </a:r>
+                      <a:r>
+                        <a:rPr/>
+                        <a:t> </a:t>
+                      </a:r>
+                      <a:r>
+                        <a:rPr/>
+                        <a:t>with</a:t>
+                      </a:r>
+                      <a:r>
+                        <a:rPr/>
+                        <a:t> </a:t>
+                      </a:r>
+                      <a:r>
+                        <a:rPr/>
+                        <a:t>large</a:t>
+                      </a:r>
+                      <a:r>
+                        <a:rPr/>
+                        <a:t> </a:t>
+                      </a:r>
+                      <a:r>
+                        <a:rPr/>
+                        <a:t>datasets</a:t>
+                      </a:r>
+                    </a:p>
+                  </a:txBody>
+                </a:tc>
+                <a:tc>
+                  <a:txBody>
+                    <a:bodyPr/>
+                    <a:lstStyle/>
+                    <a:p>
+                      <a:pPr lvl="0" marL="0" indent="0" algn="l">
+                        <a:buNone/>
+                      </a:pPr>
+                      <a:r>
+                        <a:rPr/>
+                        <a:t>Yes,</a:t>
+                      </a:r>
+                      <a:r>
+                        <a:rPr/>
+                        <a:t> </a:t>
+                      </a:r>
+                      <a:r>
+                        <a:rPr/>
+                        <a:t>with</a:t>
+                      </a:r>
+                      <a:r>
+                        <a:rPr/>
+                        <a:t> </a:t>
+                      </a:r>
+                      <a:r>
+                        <a:rPr/>
+                        <a:t>command</a:t>
+                      </a:r>
+                      <a:r>
+                        <a:rPr/>
+                        <a:t> </a:t>
+                      </a:r>
+                      <a:r>
+                        <a:rPr/>
+                        <a:t>file</a:t>
+                      </a:r>
+                    </a:p>
+                  </a:txBody>
+                </a:tc>
+              </a:tr>
+            </a:tbl>
+          </a:graphicData>
+        </a:graphic>
+      </p:graphicFrame>
+    </p:spTree>
+  </p:cSld>
+</p:sld>
+</file>
+
+<file path=ppt/slides/slide7.xml><?xml version="1.0" encoding="utf-8"?>
+<p:sld xmlns:a="http://schemas.openxmlformats.org/drawingml/2006/main" xmlns:r="http://schemas.openxmlformats.org/officeDocument/2006/relationships" xmlns:p="http://schemas.openxmlformats.org/presentationml/2006/main">
+  <p:cSld>
+    <p:spTree>
+      <p:nvGrpSpPr>
+        <p:cNvPr id="1" name=""/>
+        <p:cNvGrpSpPr/>
+        <p:nvPr/>
+      </p:nvGrpSpPr>
+      <p:grpSpPr>
+        <a:xfrm>
+          <a:off x="0" y="0"/>
+          <a:ext cx="0" cy="0"/>
+          <a:chOff x="0" y="0"/>
+          <a:chExt cx="0" cy="0"/>
+        </a:xfrm>
+      </p:grpSpPr>
+      <p:sp>
+        <p:nvSpPr>
+          <p:cNvPr id="2" name="Title 1"/>
+          <p:cNvSpPr>
+            <a:spLocks noGrp="1"/>
+          </p:cNvSpPr>
+          <p:nvPr>
+            <p:ph type="title"/>
+          </p:nvPr>
+        </p:nvSpPr>
+        <p:spPr>
+          <a:xfrm>
+            <a:off x="722313" y="4406900"/>
+            <a:ext cx="7772400" cy="1362075"/>
+          </a:xfrm>
+        </p:spPr>
+        <p:txBody>
+          <a:bodyPr/>
+          <a:lstStyle/>
+          <a:p>
+            <a:pPr lvl="0" marL="0" indent="0">
+              <a:buNone/>
+            </a:pPr>
+            <a:r>
+              <a:rPr/>
+              <a:t>Our</a:t>
+            </a:r>
+            <a:r>
+              <a:rPr/>
+              <a:t> </a:t>
+            </a:r>
+            <a:r>
+              <a:rPr/>
+              <a:t>Data</a:t>
+            </a:r>
+          </a:p>
+        </p:txBody>
+      </p:sp>
+    </p:spTree>
+  </p:cSld>
+</p:sld>
+</file>
+
+<file path=ppt/slides/slide8.xml><?xml version="1.0" encoding="utf-8"?>
+<p:sld xmlns:a="http://schemas.openxmlformats.org/drawingml/2006/main" xmlns:r="http://schemas.openxmlformats.org/officeDocument/2006/relationships" xmlns:p="http://schemas.openxmlformats.org/presentationml/2006/main">
+  <p:cSld>
+    <p:spTree>
+      <p:nvGrpSpPr>
+        <p:cNvPr id="1" name=""/>
+        <p:cNvGrpSpPr/>
+        <p:nvPr/>
+      </p:nvGrpSpPr>
+      <p:grpSpPr>
+        <a:xfrm>
+          <a:off x="0" y="0"/>
+          <a:ext cx="0" cy="0"/>
+          <a:chOff x="0" y="0"/>
+          <a:chExt cx="0" cy="0"/>
+        </a:xfrm>
+      </p:grpSpPr>
+      <p:sp>
+        <p:nvSpPr>
+          <p:cNvPr id="3" name="Content Placeholder 2"/>
+          <p:cNvSpPr>
+            <a:spLocks noGrp="1"/>
+          </p:cNvSpPr>
+          <p:nvPr>
+            <p:ph idx="1"/>
+          </p:nvPr>
+        </p:nvSpPr>
         <p:spPr/>
         <p:txBody>
           <a:bodyPr/>
@@ -4149,19 +6988,539 @@
             </a:pPr>
             <a:r>
               <a:rPr/>
-              <a:t>Simple</a:t>
+              <a:t>We take a look at our </a:t>
+            </a:r>
+            <a:r>
+              <a:rPr i="1"/>
+              <a:t>simulated</a:t>
             </a:r>
             <a:r>
               <a:rPr/>
-              <a:t> </a:t>
+              <a:t> data, which has an </a:t>
+            </a:r>
+            <a:r>
+              <a:rPr>
+                <a:latin typeface="Courier"/>
+              </a:rPr>
+              <a:t>id</a:t>
             </a:r>
             <a:r>
               <a:rPr/>
-              <a:t>Analysis</a:t>
+              <a:t> number, </a:t>
+            </a:r>
+            <a:r>
+              <a:rPr>
+                <a:latin typeface="Courier"/>
+              </a:rPr>
+              <a:t>age</a:t>
+            </a:r>
+            <a:r>
+              <a:rPr/>
+              <a:t>, and </a:t>
+            </a:r>
+            <a:r>
+              <a:rPr>
+                <a:latin typeface="Courier"/>
+              </a:rPr>
+              <a:t>happiness</a:t>
+            </a:r>
+            <a:r>
+              <a:rPr/>
+              <a:t> (on a 5 point scale, with 5 being the happiest.)</a:t>
             </a:r>
           </a:p>
         </p:txBody>
       </p:sp>
+    </p:spTree>
+  </p:cSld>
+</p:sld>
+</file>
+
+<file path=ppt/slides/slide9.xml><?xml version="1.0" encoding="utf-8"?>
+<p:sld xmlns:a="http://schemas.openxmlformats.org/drawingml/2006/main" xmlns:r="http://schemas.openxmlformats.org/officeDocument/2006/relationships" xmlns:p="http://schemas.openxmlformats.org/presentationml/2006/main">
+  <p:cSld>
+    <p:spTree>
+      <p:nvGrpSpPr>
+        <p:cNvPr id="1" name=""/>
+        <p:cNvGrpSpPr/>
+        <p:nvPr/>
+      </p:nvGrpSpPr>
+      <p:grpSpPr>
+        <a:xfrm>
+          <a:off x="0" y="0"/>
+          <a:ext cx="0" cy="0"/>
+          <a:chOff x="0" y="0"/>
+          <a:chExt cx="0" cy="0"/>
+        </a:xfrm>
+      </p:grpSpPr>
+      <p:graphicFrame>
+        <p:nvGraphicFramePr>
+          <p:cNvPr id="6" name="Content Placeholder 5"/>
+          <p:cNvGraphicFramePr>
+            <a:graphicFrameLocks noGrp="1"/>
+          </p:cNvGraphicFramePr>
+          <p:nvPr>
+            <p:ph idx="1"/>
+          </p:nvPr>
+        </p:nvGraphicFramePr>
+        <p:xfrm>
+          <a:off x="457200" y="1600200"/>
+          <a:ext cx="8229600" cy="4521200"/>
+        </p:xfrm>
+        <a:graphic>
+          <a:graphicData uri="http://schemas.openxmlformats.org/drawingml/2006/table">
+            <a:tbl>
+              <a:tblPr firstRow="1" bandRow="1">
+                <a:tableStyleId>{5C22544A-7EE6-4342-B048-85BDC9FD1C3A}</a:tableStyleId>
+              </a:tblPr>
+              <a:tblGrid>
+                <a:gridCol w="2057400"/>
+                <a:gridCol w="2057400"/>
+                <a:gridCol w="2057400"/>
+                <a:gridCol w="2057400"/>
+              </a:tblGrid>
+              <a:tr h="0">
+                <a:tc>
+                  <a:txBody>
+                    <a:bodyPr/>
+                    <a:lstStyle/>
+                    <a:p>
+                      <a:pPr lvl="0" marL="0" indent="0" algn="ctr">
+                        <a:buNone/>
+                      </a:pPr>
+                      <a:r>
+                        <a:rPr/>
+                        <a:t>id</a:t>
+                      </a:r>
+                    </a:p>
+                  </a:txBody>
+                  <a:tcPr/>
+                </a:tc>
+                <a:tc>
+                  <a:txBody>
+                    <a:bodyPr/>
+                    <a:lstStyle/>
+                    <a:p>
+                      <a:pPr lvl="0" marL="0" indent="0" algn="ctr">
+                        <a:buNone/>
+                      </a:pPr>
+                      <a:r>
+                        <a:rPr/>
+                        <a:t>age</a:t>
+                      </a:r>
+                    </a:p>
+                  </a:txBody>
+                  <a:tcPr/>
+                </a:tc>
+                <a:tc>
+                  <a:txBody>
+                    <a:bodyPr/>
+                    <a:lstStyle/>
+                    <a:p>
+                      <a:pPr lvl="0" marL="0" indent="0" algn="ctr">
+                        <a:buNone/>
+                      </a:pPr>
+                      <a:r>
+                        <a:rPr/>
+                        <a:t>happy</a:t>
+                      </a:r>
+                    </a:p>
+                  </a:txBody>
+                  <a:tcPr/>
+                </a:tc>
+                <a:tc>
+                  <a:txBody>
+                    <a:bodyPr/>
+                    <a:lstStyle/>
+                    <a:p>
+                      <a:pPr lvl="0" marL="0" indent="0" algn="ctr">
+                        <a:buNone/>
+                      </a:pPr>
+                      <a:r>
+                        <a:rPr/>
+                        <a:t>somethingelse</a:t>
+                      </a:r>
+                    </a:p>
+                  </a:txBody>
+                  <a:tcPr/>
+                </a:tc>
+              </a:tr>
+              <a:tr h="0">
+                <a:tc>
+                  <a:txBody>
+                    <a:bodyPr/>
+                    <a:lstStyle/>
+                    <a:p>
+                      <a:pPr lvl="0" marL="0" indent="0" algn="ctr">
+                        <a:buNone/>
+                      </a:pPr>
+                      <a:r>
+                        <a:rPr/>
+                        <a:t>1</a:t>
+                      </a:r>
+                    </a:p>
+                  </a:txBody>
+                </a:tc>
+                <a:tc>
+                  <a:txBody>
+                    <a:bodyPr/>
+                    <a:lstStyle/>
+                    <a:p>
+                      <a:pPr lvl="0" marL="0" indent="0" algn="ctr">
+                        <a:buNone/>
+                      </a:pPr>
+                      <a:r>
+                        <a:rPr/>
+                        <a:t>54.08</a:t>
+                      </a:r>
+                    </a:p>
+                  </a:txBody>
+                </a:tc>
+                <a:tc>
+                  <a:txBody>
+                    <a:bodyPr/>
+                    <a:lstStyle/>
+                    <a:p>
+                      <a:pPr lvl="0" marL="0" indent="0" algn="ctr">
+                        <a:buNone/>
+                      </a:pPr>
+                      <a:r>
+                        <a:rPr/>
+                        <a:t>-99</a:t>
+                      </a:r>
+                    </a:p>
+                  </a:txBody>
+                </a:tc>
+                <a:tc>
+                  <a:txBody>
+                    <a:bodyPr/>
+                    <a:lstStyle/>
+                    <a:p>
+                      <a:pPr lvl="0" marL="0" indent="0" algn="ctr">
+                        <a:buNone/>
+                      </a:pPr>
+                      <a:r>
+                        <a:rPr/>
+                        <a:t>0.458</a:t>
+                      </a:r>
+                    </a:p>
+                  </a:txBody>
+                </a:tc>
+              </a:tr>
+              <a:tr h="0">
+                <a:tc>
+                  <a:txBody>
+                    <a:bodyPr/>
+                    <a:lstStyle/>
+                    <a:p>
+                      <a:pPr lvl="0" marL="0" indent="0" algn="ctr">
+                        <a:buNone/>
+                      </a:pPr>
+                      <a:r>
+                        <a:rPr/>
+                        <a:t>2</a:t>
+                      </a:r>
+                    </a:p>
+                  </a:txBody>
+                </a:tc>
+                <a:tc>
+                  <a:txBody>
+                    <a:bodyPr/>
+                    <a:lstStyle/>
+                    <a:p>
+                      <a:pPr lvl="0" marL="0" indent="0" algn="ctr">
+                        <a:buNone/>
+                      </a:pPr>
+                      <a:r>
+                        <a:rPr/>
+                        <a:t>200</a:t>
+                      </a:r>
+                    </a:p>
+                  </a:txBody>
+                </a:tc>
+                <a:tc>
+                  <a:txBody>
+                    <a:bodyPr/>
+                    <a:lstStyle/>
+                    <a:p>
+                      <a:pPr lvl="0" marL="0" indent="0" algn="ctr">
+                        <a:buNone/>
+                      </a:pPr>
+                      <a:r>
+                        <a:rPr/>
+                        <a:t>4</a:t>
+                      </a:r>
+                    </a:p>
+                  </a:txBody>
+                </a:tc>
+                <a:tc>
+                  <a:txBody>
+                    <a:bodyPr/>
+                    <a:lstStyle/>
+                    <a:p>
+                      <a:pPr lvl="0" marL="0" indent="0" algn="ctr">
+                        <a:buNone/>
+                      </a:pPr>
+                      <a:r>
+                        <a:rPr/>
+                        <a:t>-1.262</a:t>
+                      </a:r>
+                    </a:p>
+                  </a:txBody>
+                </a:tc>
+              </a:tr>
+              <a:tr h="0">
+                <a:tc>
+                  <a:txBody>
+                    <a:bodyPr/>
+                    <a:lstStyle/>
+                    <a:p>
+                      <a:pPr lvl="0" marL="0" indent="0" algn="ctr">
+                        <a:buNone/>
+                      </a:pPr>
+                      <a:r>
+                        <a:rPr/>
+                        <a:t>3</a:t>
+                      </a:r>
+                    </a:p>
+                  </a:txBody>
+                </a:tc>
+                <a:tc>
+                  <a:txBody>
+                    <a:bodyPr/>
+                    <a:lstStyle/>
+                    <a:p>
+                      <a:pPr lvl="0" marL="0" indent="0" algn="ctr">
+                        <a:buNone/>
+                      </a:pPr>
+                      <a:r>
+                        <a:rPr/>
+                        <a:t>62.15</a:t>
+                      </a:r>
+                    </a:p>
+                  </a:txBody>
+                </a:tc>
+                <a:tc>
+                  <a:txBody>
+                    <a:bodyPr/>
+                    <a:lstStyle/>
+                    <a:p>
+                      <a:pPr lvl="0" marL="0" indent="0" algn="ctr">
+                        <a:buNone/>
+                      </a:pPr>
+                      <a:r>
+                        <a:rPr/>
+                        <a:t>-99</a:t>
+                      </a:r>
+                    </a:p>
+                  </a:txBody>
+                </a:tc>
+                <a:tc>
+                  <a:txBody>
+                    <a:bodyPr/>
+                    <a:lstStyle/>
+                    <a:p>
+                      <a:pPr lvl="0" marL="0" indent="0" algn="ctr">
+                        <a:buNone/>
+                      </a:pPr>
+                      <a:r>
+                        <a:rPr/>
+                        <a:t>-1.776</a:t>
+                      </a:r>
+                    </a:p>
+                  </a:txBody>
+                </a:tc>
+              </a:tr>
+              <a:tr h="0">
+                <a:tc>
+                  <a:txBody>
+                    <a:bodyPr/>
+                    <a:lstStyle/>
+                    <a:p>
+                      <a:pPr lvl="0" marL="0" indent="0" algn="ctr">
+                        <a:buNone/>
+                      </a:pPr>
+                      <a:r>
+                        <a:rPr/>
+                        <a:t>4</a:t>
+                      </a:r>
+                    </a:p>
+                  </a:txBody>
+                </a:tc>
+                <a:tc>
+                  <a:txBody>
+                    <a:bodyPr/>
+                    <a:lstStyle/>
+                    <a:p>
+                      <a:pPr lvl="0" marL="0" indent="0" algn="ctr">
+                        <a:buNone/>
+                      </a:pPr>
+                      <a:r>
+                        <a:rPr/>
+                        <a:t>44.95</a:t>
+                      </a:r>
+                    </a:p>
+                  </a:txBody>
+                </a:tc>
+                <a:tc>
+                  <a:txBody>
+                    <a:bodyPr/>
+                    <a:lstStyle/>
+                    <a:p>
+                      <a:pPr lvl="0" marL="0" indent="0" algn="ctr">
+                        <a:buNone/>
+                      </a:pPr>
+                      <a:r>
+                        <a:rPr/>
+                        <a:t>3</a:t>
+                      </a:r>
+                    </a:p>
+                  </a:txBody>
+                </a:tc>
+                <a:tc>
+                  <a:txBody>
+                    <a:bodyPr/>
+                    <a:lstStyle/>
+                    <a:p>
+                      <a:pPr lvl="0" marL="0" indent="0" algn="ctr">
+                        <a:buNone/>
+                      </a:pPr>
+                      <a:r>
+                        <a:rPr/>
+                        <a:t>2.267</a:t>
+                      </a:r>
+                    </a:p>
+                  </a:txBody>
+                </a:tc>
+              </a:tr>
+              <a:tr h="0">
+                <a:tc>
+                  <a:txBody>
+                    <a:bodyPr/>
+                    <a:lstStyle/>
+                    <a:p>
+                      <a:pPr lvl="0" marL="0" indent="0" algn="ctr">
+                        <a:buNone/>
+                      </a:pPr>
+                      <a:r>
+                        <a:rPr/>
+                        <a:t>5</a:t>
+                      </a:r>
+                    </a:p>
+                  </a:txBody>
+                </a:tc>
+                <a:tc>
+                  <a:txBody>
+                    <a:bodyPr/>
+                    <a:lstStyle/>
+                    <a:p>
+                      <a:pPr lvl="0" marL="0" indent="0" algn="ctr">
+                        <a:buNone/>
+                      </a:pPr>
+                      <a:r>
+                        <a:rPr/>
+                        <a:t>51.97</a:t>
+                      </a:r>
+                    </a:p>
+                  </a:txBody>
+                </a:tc>
+                <a:tc>
+                  <a:txBody>
+                    <a:bodyPr/>
+                    <a:lstStyle/>
+                    <a:p>
+                      <a:pPr lvl="0" marL="0" indent="0" algn="ctr">
+                        <a:buNone/>
+                      </a:pPr>
+                      <a:r>
+                        <a:rPr/>
+                        <a:t>3</a:t>
+                      </a:r>
+                    </a:p>
+                  </a:txBody>
+                </a:tc>
+                <a:tc>
+                  <a:txBody>
+                    <a:bodyPr/>
+                    <a:lstStyle/>
+                    <a:p>
+                      <a:pPr lvl="0" marL="0" indent="0" algn="ctr">
+                        <a:buNone/>
+                      </a:pPr>
+                      <a:r>
+                        <a:rPr/>
+                        <a:t>0.9479</a:t>
+                      </a:r>
+                    </a:p>
+                  </a:txBody>
+                </a:tc>
+              </a:tr>
+              <a:tr h="0">
+                <a:tc>
+                  <a:txBody>
+                    <a:bodyPr/>
+                    <a:lstStyle/>
+                    <a:p>
+                      <a:pPr lvl="0" marL="0" indent="0" algn="ctr">
+                        <a:buNone/>
+                      </a:pPr>
+                      <a:r>
+                        <a:rPr/>
+                        <a:t>6</a:t>
+                      </a:r>
+                    </a:p>
+                  </a:txBody>
+                </a:tc>
+                <a:tc>
+                  <a:txBody>
+                    <a:bodyPr/>
+                    <a:lstStyle/>
+                    <a:p>
+                      <a:pPr lvl="0" marL="0" indent="0" algn="ctr">
+                        <a:buNone/>
+                      </a:pPr>
+                      <a:r>
+                        <a:rPr/>
+                        <a:t>50.93</a:t>
+                      </a:r>
+                    </a:p>
+                  </a:txBody>
+                </a:tc>
+                <a:tc>
+                  <a:txBody>
+                    <a:bodyPr/>
+                    <a:lstStyle/>
+                    <a:p>
+                      <a:pPr lvl="0" marL="0" indent="0" algn="ctr">
+                        <a:buNone/>
+                      </a:pPr>
+                      <a:r>
+                        <a:rPr/>
+                        <a:t>5</a:t>
+                      </a:r>
+                    </a:p>
+                  </a:txBody>
+                </a:tc>
+                <a:tc>
+                  <a:txBody>
+                    <a:bodyPr/>
+                    <a:lstStyle/>
+                    <a:p>
+                      <a:pPr lvl="0" marL="0" indent="0" algn="ctr">
+                        <a:buNone/>
+                      </a:pPr>
+                      <a:r>
+                        <a:rPr/>
+                        <a:t>0.2352</a:t>
+                      </a:r>
+                    </a:p>
+                  </a:txBody>
+                </a:tc>
+              </a:tr>
+            </a:tbl>
+          </a:graphicData>
+        </a:graphic>
+      </p:graphicFrame>
     </p:spTree>
   </p:cSld>
 </p:sld>

</xml_diff>